<commit_message>
Adding Slides and examples for Week 3
</commit_message>
<xml_diff>
--- a/doc/java/slides/week3.pptx
+++ b/doc/java/slides/week3.pptx
@@ -5,19 +5,27 @@
     <p:sldMasterId id="2147483648" r:id="rId4"/>
   </p:sldMasterIdLst>
   <p:notesMasterIdLst>
-    <p:notesMasterId r:id="rId12"/>
+    <p:notesMasterId r:id="rId20"/>
   </p:notesMasterIdLst>
   <p:handoutMasterIdLst>
-    <p:handoutMasterId r:id="rId13"/>
+    <p:handoutMasterId r:id="rId21"/>
   </p:handoutMasterIdLst>
   <p:sldIdLst>
     <p:sldId id="262" r:id="rId5"/>
-    <p:sldId id="256" r:id="rId6"/>
-    <p:sldId id="257" r:id="rId7"/>
-    <p:sldId id="258" r:id="rId8"/>
-    <p:sldId id="259" r:id="rId9"/>
-    <p:sldId id="260" r:id="rId10"/>
-    <p:sldId id="261" r:id="rId11"/>
+    <p:sldId id="263" r:id="rId6"/>
+    <p:sldId id="264" r:id="rId7"/>
+    <p:sldId id="266" r:id="rId8"/>
+    <p:sldId id="265" r:id="rId9"/>
+    <p:sldId id="267" r:id="rId10"/>
+    <p:sldId id="268" r:id="rId11"/>
+    <p:sldId id="269" r:id="rId12"/>
+    <p:sldId id="270" r:id="rId13"/>
+    <p:sldId id="256" r:id="rId14"/>
+    <p:sldId id="257" r:id="rId15"/>
+    <p:sldId id="258" r:id="rId16"/>
+    <p:sldId id="259" r:id="rId17"/>
+    <p:sldId id="260" r:id="rId18"/>
+    <p:sldId id="261" r:id="rId19"/>
   </p:sldIdLst>
   <p:sldSz cx="12188825" cy="6858000"/>
   <p:notesSz cx="6858000" cy="9144000"/>
@@ -149,6 +157,32 @@
 </p:presentation>
 </file>
 
+<file path=ppt/commentAuthors.xml><?xml version="1.0" encoding="utf-8"?>
+<p:cmAuthorLst xmlns:a="http://schemas.openxmlformats.org/drawingml/2006/main" xmlns:r="http://schemas.openxmlformats.org/officeDocument/2006/relationships" xmlns:p="http://schemas.openxmlformats.org/presentationml/2006/main">
+  <p:cmAuthor id="1" name="Vishal Yelisetti" initials="VY" lastIdx="1" clrIdx="0">
+    <p:extLst>
+      <p:ext uri="{19B8F6BF-5375-455C-9EA6-DF929625EA0E}">
+        <p15:presenceInfo xmlns:p15="http://schemas.microsoft.com/office/powerpoint/2012/main" userId="S-1-5-21-2001221460-31874322-1008150880-47955" providerId="AD"/>
+      </p:ext>
+    </p:extLst>
+  </p:cmAuthor>
+</p:cmAuthorLst>
+</file>
+
+<file path=ppt/comments/comment1.xml><?xml version="1.0" encoding="utf-8"?>
+<p:cmLst xmlns:a="http://schemas.openxmlformats.org/drawingml/2006/main" xmlns:r="http://schemas.openxmlformats.org/officeDocument/2006/relationships" xmlns:p="http://schemas.openxmlformats.org/presentationml/2006/main">
+  <p:cm authorId="1" dt="2018-10-16T17:25:30.991" idx="1">
+    <p:pos x="10" y="10"/>
+    <p:text>We will get into methods a little later as there is a lot more to cover.</p:text>
+    <p:extLst>
+      <p:ext uri="{C676402C-5697-4E1C-873F-D02D1690AC5C}">
+        <p15:threadingInfo xmlns:p15="http://schemas.microsoft.com/office/powerpoint/2012/main" timeZoneBias="240"/>
+      </p:ext>
+    </p:extLst>
+  </p:cm>
+</p:cmLst>
+</file>
+
 <file path=ppt/handoutMasters/handoutMaster1.xml><?xml version="1.0" encoding="utf-8"?>
 <p:handoutMaster xmlns:a="http://schemas.openxmlformats.org/drawingml/2006/main" xmlns:r="http://schemas.openxmlformats.org/officeDocument/2006/relationships" xmlns:p="http://schemas.openxmlformats.org/presentationml/2006/main">
   <p:cSld>
@@ -231,7 +265,7 @@
           <a:p>
             <a:fld id="{1C482589-CB2F-4003-801D-095B67490E73}" type="datetimeFigureOut">
               <a:rPr lang="en-US"/>
-              <a:t>10/12/2018</a:t>
+              <a:t>10/16/2018</a:t>
             </a:fld>
             <a:endParaRPr/>
           </a:p>
@@ -396,7 +430,7 @@
           <a:p>
             <a:fld id="{2A7D4DBF-746C-4C25-853D-8A1CBE8404F4}" type="datetimeFigureOut">
               <a:rPr lang="en-US"/>
-              <a:t>10/12/2018</a:t>
+              <a:t>10/16/2018</a:t>
             </a:fld>
             <a:endParaRPr/>
           </a:p>
@@ -1211,7 +1245,7 @@
             <a:fld id="{881DC1F7-A9E9-4D8B-8C97-C74523B2CF2A}" type="datetimeFigureOut">
               <a:rPr lang="en-US" smtClean="0"/>
               <a:pPr/>
-              <a:t>10/12/2018</a:t>
+              <a:t>10/16/2018</a:t>
             </a:fld>
             <a:endParaRPr lang="en-US"/>
           </a:p>
@@ -1423,7 +1457,7 @@
             <a:fld id="{881DC1F7-A9E9-4D8B-8C97-C74523B2CF2A}" type="datetimeFigureOut">
               <a:rPr lang="en-US" smtClean="0"/>
               <a:pPr/>
-              <a:t>10/12/2018</a:t>
+              <a:t>10/16/2018</a:t>
             </a:fld>
             <a:endParaRPr lang="en-US"/>
           </a:p>
@@ -1645,7 +1679,7 @@
             <a:fld id="{881DC1F7-A9E9-4D8B-8C97-C74523B2CF2A}" type="datetimeFigureOut">
               <a:rPr lang="en-US" smtClean="0"/>
               <a:pPr/>
-              <a:t>10/12/2018</a:t>
+              <a:t>10/16/2018</a:t>
             </a:fld>
             <a:endParaRPr lang="en-US"/>
           </a:p>
@@ -1857,7 +1891,7 @@
             <a:fld id="{881DC1F7-A9E9-4D8B-8C97-C74523B2CF2A}" type="datetimeFigureOut">
               <a:rPr lang="en-US" smtClean="0"/>
               <a:pPr/>
-              <a:t>10/12/2018</a:t>
+              <a:t>10/16/2018</a:t>
             </a:fld>
             <a:endParaRPr lang="en-US"/>
           </a:p>
@@ -2132,7 +2166,7 @@
             <a:fld id="{881DC1F7-A9E9-4D8B-8C97-C74523B2CF2A}" type="datetimeFigureOut">
               <a:rPr lang="en-US" smtClean="0"/>
               <a:pPr/>
-              <a:t>10/12/2018</a:t>
+              <a:t>10/16/2018</a:t>
             </a:fld>
             <a:endParaRPr lang="en-US"/>
           </a:p>
@@ -2450,7 +2484,7 @@
             <a:fld id="{881DC1F7-A9E9-4D8B-8C97-C74523B2CF2A}" type="datetimeFigureOut">
               <a:rPr lang="en-US" smtClean="0"/>
               <a:pPr/>
-              <a:t>10/12/2018</a:t>
+              <a:t>10/16/2018</a:t>
             </a:fld>
             <a:endParaRPr lang="en-US"/>
           </a:p>
@@ -2908,7 +2942,7 @@
             <a:fld id="{881DC1F7-A9E9-4D8B-8C97-C74523B2CF2A}" type="datetimeFigureOut">
               <a:rPr lang="en-US" smtClean="0"/>
               <a:pPr/>
-              <a:t>10/12/2018</a:t>
+              <a:t>10/16/2018</a:t>
             </a:fld>
             <a:endParaRPr lang="en-US"/>
           </a:p>
@@ -3052,7 +3086,7 @@
             <a:fld id="{881DC1F7-A9E9-4D8B-8C97-C74523B2CF2A}" type="datetimeFigureOut">
               <a:rPr lang="en-US" smtClean="0"/>
               <a:pPr/>
-              <a:t>10/12/2018</a:t>
+              <a:t>10/16/2018</a:t>
             </a:fld>
             <a:endParaRPr lang="en-US"/>
           </a:p>
@@ -3173,7 +3207,7 @@
             <a:fld id="{881DC1F7-A9E9-4D8B-8C97-C74523B2CF2A}" type="datetimeFigureOut">
               <a:rPr lang="en-US" smtClean="0"/>
               <a:pPr/>
-              <a:t>10/12/2018</a:t>
+              <a:t>10/16/2018</a:t>
             </a:fld>
             <a:endParaRPr lang="en-US"/>
           </a:p>
@@ -3582,7 +3616,7 @@
             <a:fld id="{881DC1F7-A9E9-4D8B-8C97-C74523B2CF2A}" type="datetimeFigureOut">
               <a:rPr lang="en-US" smtClean="0"/>
               <a:pPr/>
-              <a:t>10/12/2018</a:t>
+              <a:t>10/16/2018</a:t>
             </a:fld>
             <a:endParaRPr lang="en-US"/>
           </a:p>
@@ -3989,7 +4023,7 @@
             <a:fld id="{881DC1F7-A9E9-4D8B-8C97-C74523B2CF2A}" type="datetimeFigureOut">
               <a:rPr lang="en-US" smtClean="0"/>
               <a:pPr/>
-              <a:t>10/12/2018</a:t>
+              <a:t>10/16/2018</a:t>
             </a:fld>
             <a:endParaRPr lang="en-US"/>
           </a:p>
@@ -4247,7 +4281,7 @@
             <a:fld id="{881DC1F7-A9E9-4D8B-8C97-C74523B2CF2A}" type="datetimeFigureOut">
               <a:rPr lang="en-US"/>
               <a:pPr/>
-              <a:t>10/12/2018</a:t>
+              <a:t>10/16/2018</a:t>
             </a:fld>
             <a:endParaRPr/>
           </a:p>
@@ -4710,7 +4744,7 @@
 </p:sld>
 </file>
 
-<file path=ppt/slides/slide2.xml><?xml version="1.0" encoding="utf-8"?>
+<file path=ppt/slides/slide10.xml><?xml version="1.0" encoding="utf-8"?>
 <p:sld xmlns:a="http://schemas.openxmlformats.org/drawingml/2006/main" xmlns:r="http://schemas.openxmlformats.org/officeDocument/2006/relationships" xmlns:p="http://schemas.openxmlformats.org/presentationml/2006/main">
   <p:cSld>
     <p:spTree>
@@ -4737,14 +4771,39 @@
             <p:ph type="title"/>
           </p:nvPr>
         </p:nvSpPr>
-        <p:spPr/>
-        <p:txBody>
-          <a:bodyPr/>
+        <p:spPr>
+          <a:xfrm>
+            <a:off x="1293814" y="457200"/>
+            <a:ext cx="9601200" cy="1143000"/>
+          </a:xfrm>
+        </p:spPr>
+        <p:txBody>
+          <a:bodyPr>
+            <a:normAutofit fontScale="90000"/>
+          </a:bodyPr>
           <a:lstStyle/>
           <a:p>
             <a:r>
               <a:rPr lang="en-US" dirty="0" smtClean="0"/>
-              <a:t>Different Kinds of loops</a:t>
+              <a:t>Switching Gears…</a:t>
+            </a:r>
+            <a:br>
+              <a:rPr lang="en-US" dirty="0" smtClean="0"/>
+            </a:br>
+            <a:r>
+              <a:rPr lang="en-US" dirty="0" smtClean="0"/>
+              <a:t/>
+            </a:r>
+            <a:br>
+              <a:rPr lang="en-US" dirty="0" smtClean="0"/>
+            </a:br>
+            <a:r>
+              <a:rPr lang="en-US" dirty="0" smtClean="0"/>
+              <a:t>Different </a:t>
+            </a:r>
+            <a:r>
+              <a:rPr lang="en-US" dirty="0" smtClean="0"/>
+              <a:t>Kinds of loops</a:t>
             </a:r>
             <a:endParaRPr lang="en-US" dirty="0"/>
           </a:p>
@@ -4834,7 +4893,7 @@
 </p:sld>
 </file>
 
-<file path=ppt/slides/slide3.xml><?xml version="1.0" encoding="utf-8"?>
+<file path=ppt/slides/slide11.xml><?xml version="1.0" encoding="utf-8"?>
 <p:sld xmlns:a="http://schemas.openxmlformats.org/drawingml/2006/main" xmlns:r="http://schemas.openxmlformats.org/officeDocument/2006/relationships" xmlns:p="http://schemas.openxmlformats.org/presentationml/2006/main">
   <p:cSld>
     <p:spTree>
@@ -4962,7 +5021,7 @@
 </p:sld>
 </file>
 
-<file path=ppt/slides/slide4.xml><?xml version="1.0" encoding="utf-8"?>
+<file path=ppt/slides/slide12.xml><?xml version="1.0" encoding="utf-8"?>
 <p:sld xmlns:a="http://schemas.openxmlformats.org/drawingml/2006/main" xmlns:r="http://schemas.openxmlformats.org/officeDocument/2006/relationships" xmlns:p="http://schemas.openxmlformats.org/presentationml/2006/main">
   <p:cSld>
     <p:spTree>
@@ -5101,7 +5160,7 @@
 </p:sld>
 </file>
 
-<file path=ppt/slides/slide5.xml><?xml version="1.0" encoding="utf-8"?>
+<file path=ppt/slides/slide13.xml><?xml version="1.0" encoding="utf-8"?>
 <p:sld xmlns:a="http://schemas.openxmlformats.org/drawingml/2006/main" xmlns:r="http://schemas.openxmlformats.org/officeDocument/2006/relationships" xmlns:p="http://schemas.openxmlformats.org/presentationml/2006/main">
   <p:cSld>
     <p:spTree>
@@ -5248,6 +5307,946 @@
 </p:sld>
 </file>
 
+<file path=ppt/slides/slide14.xml><?xml version="1.0" encoding="utf-8"?>
+<p:sld xmlns:a="http://schemas.openxmlformats.org/drawingml/2006/main" xmlns:r="http://schemas.openxmlformats.org/officeDocument/2006/relationships" xmlns:p="http://schemas.openxmlformats.org/presentationml/2006/main">
+  <p:cSld>
+    <p:spTree>
+      <p:nvGrpSpPr>
+        <p:cNvPr id="1" name=""/>
+        <p:cNvGrpSpPr/>
+        <p:nvPr/>
+      </p:nvGrpSpPr>
+      <p:grpSpPr>
+        <a:xfrm>
+          <a:off x="0" y="0"/>
+          <a:ext cx="0" cy="0"/>
+          <a:chOff x="0" y="0"/>
+          <a:chExt cx="0" cy="0"/>
+        </a:xfrm>
+      </p:grpSpPr>
+      <p:sp>
+        <p:nvSpPr>
+          <p:cNvPr id="2" name="Title 1"/>
+          <p:cNvSpPr>
+            <a:spLocks noGrp="1"/>
+          </p:cNvSpPr>
+          <p:nvPr>
+            <p:ph type="title"/>
+          </p:nvPr>
+        </p:nvSpPr>
+        <p:spPr/>
+        <p:txBody>
+          <a:bodyPr/>
+          <a:lstStyle/>
+          <a:p>
+            <a:r>
+              <a:rPr lang="en-US" dirty="0" smtClean="0"/>
+              <a:t>Let’s Try it</a:t>
+            </a:r>
+            <a:endParaRPr lang="en-US" dirty="0"/>
+          </a:p>
+        </p:txBody>
+      </p:sp>
+      <p:sp>
+        <p:nvSpPr>
+          <p:cNvPr id="3" name="Content Placeholder 2"/>
+          <p:cNvSpPr>
+            <a:spLocks noGrp="1"/>
+          </p:cNvSpPr>
+          <p:nvPr>
+            <p:ph idx="1"/>
+          </p:nvPr>
+        </p:nvSpPr>
+        <p:spPr/>
+        <p:txBody>
+          <a:bodyPr/>
+          <a:lstStyle/>
+          <a:p>
+            <a:r>
+              <a:rPr lang="en-US" dirty="0" smtClean="0"/>
+              <a:t>Create a While loop that prints the numbers from 5 through 10</a:t>
+            </a:r>
+          </a:p>
+          <a:p>
+            <a:r>
+              <a:rPr lang="en-US" dirty="0" smtClean="0"/>
+              <a:t>Create a for loop that begins at 10 and decrements to the number 5</a:t>
+            </a:r>
+          </a:p>
+          <a:p>
+            <a:r>
+              <a:rPr lang="en-US" dirty="0" smtClean="0"/>
+              <a:t>Create a do while loop that starts at value 10 and increments to 16</a:t>
+            </a:r>
+          </a:p>
+          <a:p>
+            <a:r>
+              <a:rPr lang="en-US" dirty="0" smtClean="0"/>
+              <a:t>Create </a:t>
+            </a:r>
+            <a:r>
+              <a:rPr lang="en-US" smtClean="0"/>
+              <a:t>a while </a:t>
+            </a:r>
+            <a:r>
+              <a:rPr lang="en-US" dirty="0" smtClean="0"/>
+              <a:t>loop that </a:t>
+            </a:r>
+            <a:r>
+              <a:rPr lang="en-US" smtClean="0"/>
+              <a:t>is infinite and never quits (We will do this together!)</a:t>
+            </a:r>
+            <a:endParaRPr lang="en-US" dirty="0"/>
+          </a:p>
+        </p:txBody>
+      </p:sp>
+    </p:spTree>
+    <p:extLst>
+      <p:ext uri="{BB962C8B-B14F-4D97-AF65-F5344CB8AC3E}">
+        <p14:creationId xmlns:p14="http://schemas.microsoft.com/office/powerpoint/2010/main" val="1578329932"/>
+      </p:ext>
+    </p:extLst>
+  </p:cSld>
+  <p:clrMapOvr>
+    <a:masterClrMapping/>
+  </p:clrMapOvr>
+  <mc:AlternateContent xmlns:mc="http://schemas.openxmlformats.org/markup-compatibility/2006" xmlns:p14="http://schemas.microsoft.com/office/powerpoint/2010/main">
+    <mc:Choice Requires="p14">
+      <p:transition spd="med" p14:dur="700">
+        <p:fade/>
+      </p:transition>
+    </mc:Choice>
+    <mc:Fallback xmlns="">
+      <p:transition spd="med">
+        <p:fade/>
+      </p:transition>
+    </mc:Fallback>
+  </mc:AlternateContent>
+</p:sld>
+</file>
+
+<file path=ppt/slides/slide15.xml><?xml version="1.0" encoding="utf-8"?>
+<p:sld xmlns:a="http://schemas.openxmlformats.org/drawingml/2006/main" xmlns:r="http://schemas.openxmlformats.org/officeDocument/2006/relationships" xmlns:p="http://schemas.openxmlformats.org/presentationml/2006/main">
+  <p:cSld>
+    <p:spTree>
+      <p:nvGrpSpPr>
+        <p:cNvPr id="1" name=""/>
+        <p:cNvGrpSpPr/>
+        <p:nvPr/>
+      </p:nvGrpSpPr>
+      <p:grpSpPr>
+        <a:xfrm>
+          <a:off x="0" y="0"/>
+          <a:ext cx="0" cy="0"/>
+          <a:chOff x="0" y="0"/>
+          <a:chExt cx="0" cy="0"/>
+        </a:xfrm>
+      </p:grpSpPr>
+      <p:sp>
+        <p:nvSpPr>
+          <p:cNvPr id="2" name="Title 1"/>
+          <p:cNvSpPr>
+            <a:spLocks noGrp="1"/>
+          </p:cNvSpPr>
+          <p:nvPr>
+            <p:ph type="title"/>
+          </p:nvPr>
+        </p:nvSpPr>
+        <p:spPr/>
+        <p:txBody>
+          <a:bodyPr/>
+          <a:lstStyle/>
+          <a:p>
+            <a:r>
+              <a:rPr lang="en-US" dirty="0" smtClean="0"/>
+              <a:t>Homework!</a:t>
+            </a:r>
+            <a:endParaRPr lang="en-US" dirty="0"/>
+          </a:p>
+        </p:txBody>
+      </p:sp>
+      <p:sp>
+        <p:nvSpPr>
+          <p:cNvPr id="3" name="Content Placeholder 2"/>
+          <p:cNvSpPr>
+            <a:spLocks noGrp="1"/>
+          </p:cNvSpPr>
+          <p:nvPr>
+            <p:ph idx="1"/>
+          </p:nvPr>
+        </p:nvSpPr>
+        <p:spPr/>
+        <p:txBody>
+          <a:bodyPr/>
+          <a:lstStyle/>
+          <a:p>
+            <a:r>
+              <a:rPr lang="en-US" dirty="0" smtClean="0"/>
+              <a:t>Calculate the area of circle using user input</a:t>
+            </a:r>
+          </a:p>
+          <a:p>
+            <a:r>
+              <a:rPr lang="en-US" dirty="0" smtClean="0"/>
+              <a:t>Tip: </a:t>
+            </a:r>
+          </a:p>
+          <a:p>
+            <a:pPr lvl="1"/>
+            <a:r>
+              <a:rPr lang="en-US" dirty="0" smtClean="0"/>
+              <a:t>Use import </a:t>
+            </a:r>
+            <a:r>
+              <a:rPr lang="en-US" b="1" dirty="0" err="1" smtClean="0"/>
+              <a:t>java.util.Scanner</a:t>
+            </a:r>
+            <a:r>
+              <a:rPr lang="en-US" dirty="0" smtClean="0"/>
+              <a:t>;</a:t>
+            </a:r>
+          </a:p>
+          <a:p>
+            <a:pPr lvl="1"/>
+            <a:r>
+              <a:rPr lang="en-US" dirty="0" smtClean="0"/>
+              <a:t>Use </a:t>
+            </a:r>
+            <a:r>
+              <a:rPr lang="en-US" dirty="0" err="1" smtClean="0"/>
+              <a:t>Math.pow</a:t>
+            </a:r>
+            <a:r>
+              <a:rPr lang="en-US" dirty="0" smtClean="0"/>
+              <a:t>(</a:t>
+            </a:r>
+            <a:r>
+              <a:rPr lang="en-US" dirty="0" err="1" smtClean="0"/>
+              <a:t>a,b</a:t>
+            </a:r>
+            <a:r>
+              <a:rPr lang="en-US" dirty="0" smtClean="0"/>
+              <a:t>)</a:t>
+            </a:r>
+          </a:p>
+          <a:p>
+            <a:pPr lvl="2"/>
+            <a:r>
+              <a:rPr lang="en-US" dirty="0" smtClean="0"/>
+              <a:t>a = radius</a:t>
+            </a:r>
+          </a:p>
+          <a:p>
+            <a:pPr lvl="2"/>
+            <a:r>
+              <a:rPr lang="en-US" dirty="0" smtClean="0"/>
+              <a:t>b = power you want to raise it to</a:t>
+            </a:r>
+          </a:p>
+          <a:p>
+            <a:r>
+              <a:rPr lang="en-US" dirty="0" smtClean="0"/>
+              <a:t>Configuration Change to </a:t>
+            </a:r>
+            <a:r>
+              <a:rPr lang="en-US" dirty="0" err="1" smtClean="0"/>
+              <a:t>launch.json</a:t>
+            </a:r>
+            <a:r>
+              <a:rPr lang="en-US" dirty="0" smtClean="0"/>
+              <a:t> </a:t>
+            </a:r>
+          </a:p>
+          <a:p>
+            <a:pPr lvl="1"/>
+            <a:r>
+              <a:rPr lang="en-US" dirty="0" smtClean="0"/>
+              <a:t>Change “console”: for your class from “</a:t>
+            </a:r>
+            <a:r>
+              <a:rPr lang="en-US" dirty="0" err="1" smtClean="0"/>
+              <a:t>internalConsole</a:t>
+            </a:r>
+            <a:r>
+              <a:rPr lang="en-US" dirty="0" smtClean="0"/>
+              <a:t>” </a:t>
+            </a:r>
+            <a:r>
+              <a:rPr lang="en-US" dirty="0"/>
+              <a:t>to “</a:t>
+            </a:r>
+            <a:r>
+              <a:rPr lang="en-US" dirty="0" err="1" smtClean="0"/>
+              <a:t>integratedTerminal</a:t>
+            </a:r>
+            <a:r>
+              <a:rPr lang="en-US" dirty="0" smtClean="0"/>
+              <a:t>”</a:t>
+            </a:r>
+          </a:p>
+        </p:txBody>
+      </p:sp>
+    </p:spTree>
+    <p:extLst>
+      <p:ext uri="{BB962C8B-B14F-4D97-AF65-F5344CB8AC3E}">
+        <p14:creationId xmlns:p14="http://schemas.microsoft.com/office/powerpoint/2010/main" val="750517101"/>
+      </p:ext>
+    </p:extLst>
+  </p:cSld>
+  <p:clrMapOvr>
+    <a:masterClrMapping/>
+  </p:clrMapOvr>
+  <mc:AlternateContent xmlns:mc="http://schemas.openxmlformats.org/markup-compatibility/2006" xmlns:p14="http://schemas.microsoft.com/office/powerpoint/2010/main">
+    <mc:Choice Requires="p14">
+      <p:transition spd="med" p14:dur="700">
+        <p:fade/>
+      </p:transition>
+    </mc:Choice>
+    <mc:Fallback xmlns="">
+      <p:transition spd="med">
+        <p:fade/>
+      </p:transition>
+    </mc:Fallback>
+  </mc:AlternateContent>
+</p:sld>
+</file>
+
+<file path=ppt/slides/slide2.xml><?xml version="1.0" encoding="utf-8"?>
+<p:sld xmlns:a="http://schemas.openxmlformats.org/drawingml/2006/main" xmlns:r="http://schemas.openxmlformats.org/officeDocument/2006/relationships" xmlns:p="http://schemas.openxmlformats.org/presentationml/2006/main">
+  <p:cSld>
+    <p:spTree>
+      <p:nvGrpSpPr>
+        <p:cNvPr id="1" name=""/>
+        <p:cNvGrpSpPr/>
+        <p:nvPr/>
+      </p:nvGrpSpPr>
+      <p:grpSpPr>
+        <a:xfrm>
+          <a:off x="0" y="0"/>
+          <a:ext cx="0" cy="0"/>
+          <a:chOff x="0" y="0"/>
+          <a:chExt cx="0" cy="0"/>
+        </a:xfrm>
+      </p:grpSpPr>
+      <p:sp>
+        <p:nvSpPr>
+          <p:cNvPr id="2" name="Title 1"/>
+          <p:cNvSpPr>
+            <a:spLocks noGrp="1"/>
+          </p:cNvSpPr>
+          <p:nvPr>
+            <p:ph type="title"/>
+          </p:nvPr>
+        </p:nvSpPr>
+        <p:spPr/>
+        <p:txBody>
+          <a:bodyPr/>
+          <a:lstStyle/>
+          <a:p>
+            <a:r>
+              <a:rPr lang="en-US" dirty="0" smtClean="0"/>
+              <a:t>Refresher….</a:t>
+            </a:r>
+            <a:endParaRPr lang="en-US" dirty="0"/>
+          </a:p>
+        </p:txBody>
+      </p:sp>
+      <p:sp>
+        <p:nvSpPr>
+          <p:cNvPr id="3" name="Content Placeholder 2"/>
+          <p:cNvSpPr>
+            <a:spLocks noGrp="1"/>
+          </p:cNvSpPr>
+          <p:nvPr>
+            <p:ph idx="1"/>
+          </p:nvPr>
+        </p:nvSpPr>
+        <p:spPr/>
+        <p:txBody>
+          <a:bodyPr/>
+          <a:lstStyle/>
+          <a:p>
+            <a:r>
+              <a:rPr lang="en-US" dirty="0" smtClean="0"/>
+              <a:t>Largest of Three Numbers…</a:t>
+            </a:r>
+          </a:p>
+          <a:p>
+            <a:pPr lvl="1"/>
+            <a:r>
+              <a:rPr lang="en-US" dirty="0" smtClean="0"/>
+              <a:t>Talk about various instances</a:t>
+            </a:r>
+          </a:p>
+          <a:p>
+            <a:pPr lvl="2"/>
+            <a:r>
+              <a:rPr lang="en-US" dirty="0" smtClean="0"/>
+              <a:t>If there are 10 numbers, what would happen? (Don’t need to code)</a:t>
+            </a:r>
+          </a:p>
+          <a:p>
+            <a:pPr lvl="2"/>
+            <a:r>
+              <a:rPr lang="en-US" dirty="0" smtClean="0"/>
+              <a:t>What would happen if they are double’s and </a:t>
+            </a:r>
+            <a:r>
+              <a:rPr lang="en-US" dirty="0" err="1" smtClean="0"/>
+              <a:t>int’s</a:t>
+            </a:r>
+            <a:r>
+              <a:rPr lang="en-US" dirty="0" smtClean="0"/>
+              <a:t>?\</a:t>
+            </a:r>
+          </a:p>
+          <a:p>
+            <a:pPr lvl="2"/>
+            <a:r>
+              <a:rPr lang="en-US" dirty="0" smtClean="0"/>
+              <a:t>…</a:t>
+            </a:r>
+          </a:p>
+          <a:p>
+            <a:pPr lvl="1"/>
+            <a:r>
+              <a:rPr lang="en-US" dirty="0" smtClean="0"/>
+              <a:t>Concept of Methods</a:t>
+            </a:r>
+          </a:p>
+          <a:p>
+            <a:pPr lvl="2"/>
+            <a:r>
+              <a:rPr lang="en-US" dirty="0" smtClean="0"/>
+              <a:t>Testing the method with various inputs</a:t>
+            </a:r>
+          </a:p>
+          <a:p>
+            <a:pPr marL="731520" lvl="2" indent="0">
+              <a:buNone/>
+            </a:pPr>
+            <a:endParaRPr lang="en-US" dirty="0" smtClean="0"/>
+          </a:p>
+        </p:txBody>
+      </p:sp>
+    </p:spTree>
+    <p:extLst>
+      <p:ext uri="{BB962C8B-B14F-4D97-AF65-F5344CB8AC3E}">
+        <p14:creationId xmlns:p14="http://schemas.microsoft.com/office/powerpoint/2010/main" val="2964335429"/>
+      </p:ext>
+    </p:extLst>
+  </p:cSld>
+  <p:clrMapOvr>
+    <a:masterClrMapping/>
+  </p:clrMapOvr>
+  <mc:AlternateContent xmlns:mc="http://schemas.openxmlformats.org/markup-compatibility/2006" xmlns:p14="http://schemas.microsoft.com/office/powerpoint/2010/main">
+    <mc:Choice Requires="p14">
+      <p:transition spd="med" p14:dur="700">
+        <p:fade/>
+      </p:transition>
+    </mc:Choice>
+    <mc:Fallback xmlns="">
+      <p:transition spd="med">
+        <p:fade/>
+      </p:transition>
+    </mc:Fallback>
+  </mc:AlternateContent>
+</p:sld>
+</file>
+
+<file path=ppt/slides/slide3.xml><?xml version="1.0" encoding="utf-8"?>
+<p:sld xmlns:a="http://schemas.openxmlformats.org/drawingml/2006/main" xmlns:r="http://schemas.openxmlformats.org/officeDocument/2006/relationships" xmlns:p="http://schemas.openxmlformats.org/presentationml/2006/main">
+  <p:cSld>
+    <p:spTree>
+      <p:nvGrpSpPr>
+        <p:cNvPr id="1" name=""/>
+        <p:cNvGrpSpPr/>
+        <p:nvPr/>
+      </p:nvGrpSpPr>
+      <p:grpSpPr>
+        <a:xfrm>
+          <a:off x="0" y="0"/>
+          <a:ext cx="0" cy="0"/>
+          <a:chOff x="0" y="0"/>
+          <a:chExt cx="0" cy="0"/>
+        </a:xfrm>
+      </p:grpSpPr>
+      <p:sp>
+        <p:nvSpPr>
+          <p:cNvPr id="2" name="Title 1"/>
+          <p:cNvSpPr>
+            <a:spLocks noGrp="1"/>
+          </p:cNvSpPr>
+          <p:nvPr>
+            <p:ph type="title"/>
+          </p:nvPr>
+        </p:nvSpPr>
+        <p:spPr/>
+        <p:txBody>
+          <a:bodyPr/>
+          <a:lstStyle/>
+          <a:p>
+            <a:r>
+              <a:rPr lang="en-US" dirty="0" smtClean="0"/>
+              <a:t>Methods</a:t>
+            </a:r>
+            <a:endParaRPr lang="en-US" dirty="0"/>
+          </a:p>
+        </p:txBody>
+      </p:sp>
+      <p:sp>
+        <p:nvSpPr>
+          <p:cNvPr id="3" name="Content Placeholder 2"/>
+          <p:cNvSpPr>
+            <a:spLocks noGrp="1"/>
+          </p:cNvSpPr>
+          <p:nvPr>
+            <p:ph idx="1"/>
+          </p:nvPr>
+        </p:nvSpPr>
+        <p:spPr/>
+        <p:txBody>
+          <a:bodyPr/>
+          <a:lstStyle/>
+          <a:p>
+            <a:r>
+              <a:rPr lang="en-US" dirty="0" smtClean="0"/>
+              <a:t>Collection of statements grouped together</a:t>
+            </a:r>
+          </a:p>
+          <a:p>
+            <a:pPr lvl="1"/>
+            <a:r>
+              <a:rPr lang="en-US" dirty="0" err="1" smtClean="0"/>
+              <a:t>System.out.println</a:t>
+            </a:r>
+            <a:r>
+              <a:rPr lang="en-US" dirty="0" smtClean="0"/>
+              <a:t>(): Calls number of statements under the hood to actually print to the console. </a:t>
+            </a:r>
+          </a:p>
+          <a:p>
+            <a:pPr lvl="1"/>
+            <a:endParaRPr lang="en-US" dirty="0"/>
+          </a:p>
+          <a:p>
+            <a:pPr marL="365760" lvl="1" indent="0">
+              <a:buNone/>
+            </a:pPr>
+            <a:endParaRPr lang="en-US" dirty="0" smtClean="0"/>
+          </a:p>
+        </p:txBody>
+      </p:sp>
+      <p:pic>
+        <p:nvPicPr>
+          <p:cNvPr id="1026" name="Picture 2" descr="https://cdncontribute.geeksforgeeks.org/wp-content/uploads/methods-in-java.png"/>
+          <p:cNvPicPr>
+            <a:picLocks noChangeAspect="1" noChangeArrowheads="1"/>
+          </p:cNvPicPr>
+          <p:nvPr/>
+        </p:nvPicPr>
+        <p:blipFill>
+          <a:blip r:embed="rId2">
+            <a:extLst>
+              <a:ext uri="{28A0092B-C50C-407E-A947-70E740481C1C}">
+                <a14:useLocalDpi xmlns:a14="http://schemas.microsoft.com/office/drawing/2010/main" val="0"/>
+              </a:ext>
+            </a:extLst>
+          </a:blip>
+          <a:srcRect/>
+          <a:stretch>
+            <a:fillRect/>
+          </a:stretch>
+        </p:blipFill>
+        <p:spPr bwMode="auto">
+          <a:xfrm>
+            <a:off x="2817812" y="3200400"/>
+            <a:ext cx="6000750" cy="2876551"/>
+          </a:xfrm>
+          <a:prstGeom prst="rect">
+            <a:avLst/>
+          </a:prstGeom>
+          <a:noFill/>
+          <a:extLst>
+            <a:ext uri="{909E8E84-426E-40DD-AFC4-6F175D3DCCD1}">
+              <a14:hiddenFill xmlns:a14="http://schemas.microsoft.com/office/drawing/2010/main">
+                <a:solidFill>
+                  <a:srgbClr val="FFFFFF"/>
+                </a:solidFill>
+              </a14:hiddenFill>
+            </a:ext>
+          </a:extLst>
+        </p:spPr>
+      </p:pic>
+    </p:spTree>
+    <p:extLst>
+      <p:ext uri="{BB962C8B-B14F-4D97-AF65-F5344CB8AC3E}">
+        <p14:creationId xmlns:p14="http://schemas.microsoft.com/office/powerpoint/2010/main" val="1468717865"/>
+      </p:ext>
+    </p:extLst>
+  </p:cSld>
+  <p:clrMapOvr>
+    <a:masterClrMapping/>
+  </p:clrMapOvr>
+  <mc:AlternateContent xmlns:mc="http://schemas.openxmlformats.org/markup-compatibility/2006" xmlns:p14="http://schemas.microsoft.com/office/powerpoint/2010/main">
+    <mc:Choice Requires="p14">
+      <p:transition spd="med" p14:dur="700">
+        <p:fade/>
+      </p:transition>
+    </mc:Choice>
+    <mc:Fallback xmlns="">
+      <p:transition spd="med">
+        <p:fade/>
+      </p:transition>
+    </mc:Fallback>
+  </mc:AlternateContent>
+</p:sld>
+</file>
+
+<file path=ppt/slides/slide4.xml><?xml version="1.0" encoding="utf-8"?>
+<p:sld xmlns:a="http://schemas.openxmlformats.org/drawingml/2006/main" xmlns:r="http://schemas.openxmlformats.org/officeDocument/2006/relationships" xmlns:p="http://schemas.openxmlformats.org/presentationml/2006/main">
+  <p:cSld>
+    <p:spTree>
+      <p:nvGrpSpPr>
+        <p:cNvPr id="1" name=""/>
+        <p:cNvGrpSpPr/>
+        <p:nvPr/>
+      </p:nvGrpSpPr>
+      <p:grpSpPr>
+        <a:xfrm>
+          <a:off x="0" y="0"/>
+          <a:ext cx="0" cy="0"/>
+          <a:chOff x="0" y="0"/>
+          <a:chExt cx="0" cy="0"/>
+        </a:xfrm>
+      </p:grpSpPr>
+      <p:sp>
+        <p:nvSpPr>
+          <p:cNvPr id="2" name="Title 1"/>
+          <p:cNvSpPr>
+            <a:spLocks noGrp="1"/>
+          </p:cNvSpPr>
+          <p:nvPr>
+            <p:ph type="title"/>
+          </p:nvPr>
+        </p:nvSpPr>
+        <p:spPr/>
+        <p:txBody>
+          <a:bodyPr/>
+          <a:lstStyle/>
+          <a:p>
+            <a:r>
+              <a:rPr lang="en-US" dirty="0" smtClean="0"/>
+              <a:t>Methods (</a:t>
+            </a:r>
+            <a:r>
+              <a:rPr lang="en-US" dirty="0" err="1" smtClean="0"/>
+              <a:t>cont</a:t>
+            </a:r>
+            <a:r>
+              <a:rPr lang="en-US" dirty="0" smtClean="0"/>
+              <a:t>…)</a:t>
+            </a:r>
+            <a:endParaRPr lang="en-US" dirty="0"/>
+          </a:p>
+        </p:txBody>
+      </p:sp>
+      <p:sp>
+        <p:nvSpPr>
+          <p:cNvPr id="3" name="Content Placeholder 2"/>
+          <p:cNvSpPr>
+            <a:spLocks noGrp="1"/>
+          </p:cNvSpPr>
+          <p:nvPr>
+            <p:ph idx="1"/>
+          </p:nvPr>
+        </p:nvSpPr>
+        <p:spPr/>
+        <p:txBody>
+          <a:bodyPr>
+            <a:normAutofit lnSpcReduction="10000"/>
+          </a:bodyPr>
+          <a:lstStyle/>
+          <a:p>
+            <a:r>
+              <a:rPr lang="en-US" dirty="0"/>
+              <a:t>A method name is typically a single word that should be a </a:t>
+            </a:r>
+            <a:r>
+              <a:rPr lang="en-US" b="1" dirty="0"/>
+              <a:t>verb</a:t>
+            </a:r>
+            <a:r>
+              <a:rPr lang="en-US" dirty="0"/>
+              <a:t> in lowercase or multi-word, that begins with a </a:t>
+            </a:r>
+            <a:r>
+              <a:rPr lang="en-US" b="1" dirty="0"/>
+              <a:t>verb</a:t>
+            </a:r>
+            <a:r>
+              <a:rPr lang="en-US" dirty="0"/>
+              <a:t> in lowercase followed by </a:t>
+            </a:r>
+            <a:r>
+              <a:rPr lang="en-US" b="1" dirty="0"/>
+              <a:t>adjective, noun….. </a:t>
+            </a:r>
+            <a:endParaRPr lang="en-US" b="1" dirty="0" smtClean="0"/>
+          </a:p>
+          <a:p>
+            <a:pPr lvl="1"/>
+            <a:r>
+              <a:rPr lang="en-US" dirty="0" smtClean="0"/>
+              <a:t>After </a:t>
+            </a:r>
+            <a:r>
+              <a:rPr lang="en-US" dirty="0"/>
+              <a:t>the first word, first letter of each word should be </a:t>
+            </a:r>
+            <a:r>
+              <a:rPr lang="en-US" dirty="0" smtClean="0"/>
+              <a:t>capitalized</a:t>
+            </a:r>
+            <a:r>
+              <a:rPr lang="en-US" dirty="0"/>
+              <a:t> </a:t>
+            </a:r>
+            <a:r>
+              <a:rPr lang="en-US" dirty="0" smtClean="0"/>
+              <a:t>(Camel-cased)</a:t>
+            </a:r>
+          </a:p>
+          <a:p>
+            <a:pPr lvl="2"/>
+            <a:r>
+              <a:rPr lang="en-US" dirty="0" smtClean="0"/>
+              <a:t>For </a:t>
+            </a:r>
+            <a:r>
+              <a:rPr lang="en-US" dirty="0"/>
+              <a:t>example, </a:t>
+            </a:r>
+            <a:r>
+              <a:rPr lang="en-US" dirty="0" err="1"/>
+              <a:t>findSum</a:t>
+            </a:r>
+            <a:r>
+              <a:rPr lang="en-US" dirty="0" smtClean="0"/>
+              <a:t>, </a:t>
+            </a:r>
+            <a:r>
+              <a:rPr lang="en-US" dirty="0" err="1" smtClean="0"/>
+              <a:t>computeMax</a:t>
+            </a:r>
+            <a:r>
+              <a:rPr lang="en-US" dirty="0"/>
+              <a:t>, </a:t>
+            </a:r>
+            <a:r>
+              <a:rPr lang="en-US" dirty="0" err="1"/>
+              <a:t>setX</a:t>
+            </a:r>
+            <a:r>
+              <a:rPr lang="en-US" dirty="0"/>
+              <a:t> and </a:t>
+            </a:r>
+            <a:r>
+              <a:rPr lang="en-US" dirty="0" err="1" smtClean="0"/>
+              <a:t>getX</a:t>
+            </a:r>
+            <a:endParaRPr lang="en-US" dirty="0" smtClean="0"/>
+          </a:p>
+          <a:p>
+            <a:r>
+              <a:rPr lang="en-US" dirty="0" smtClean="0"/>
+              <a:t>Remember to call the method in the main method</a:t>
+            </a:r>
+          </a:p>
+          <a:p>
+            <a:pPr lvl="1"/>
+            <a:r>
+              <a:rPr lang="en-US" dirty="0" smtClean="0"/>
+              <a:t>The method will do nothing if the method is never called</a:t>
+            </a:r>
+          </a:p>
+          <a:p>
+            <a:r>
+              <a:rPr lang="en-US" dirty="0" smtClean="0"/>
+              <a:t>Methods usually should return something or throw an exception</a:t>
+            </a:r>
+          </a:p>
+          <a:p>
+            <a:pPr lvl="1"/>
+            <a:r>
+              <a:rPr lang="en-US" dirty="0" smtClean="0"/>
+              <a:t>Makes debugging easier</a:t>
+            </a:r>
+          </a:p>
+          <a:p>
+            <a:pPr lvl="1"/>
+            <a:r>
+              <a:rPr lang="en-US" dirty="0" smtClean="0"/>
+              <a:t>Ensure that the right value is being returned</a:t>
+            </a:r>
+          </a:p>
+          <a:p>
+            <a:pPr lvl="1"/>
+            <a:r>
+              <a:rPr lang="en-US" dirty="0" smtClean="0"/>
+              <a:t>“void” return type is the exception – this will return nothing</a:t>
+            </a:r>
+          </a:p>
+          <a:p>
+            <a:pPr lvl="1"/>
+            <a:endParaRPr lang="en-US" dirty="0" smtClean="0"/>
+          </a:p>
+        </p:txBody>
+      </p:sp>
+    </p:spTree>
+    <p:extLst>
+      <p:ext uri="{BB962C8B-B14F-4D97-AF65-F5344CB8AC3E}">
+        <p14:creationId xmlns:p14="http://schemas.microsoft.com/office/powerpoint/2010/main" val="1574259687"/>
+      </p:ext>
+    </p:extLst>
+  </p:cSld>
+  <p:clrMapOvr>
+    <a:masterClrMapping/>
+  </p:clrMapOvr>
+  <mc:AlternateContent xmlns:mc="http://schemas.openxmlformats.org/markup-compatibility/2006" xmlns:p14="http://schemas.microsoft.com/office/powerpoint/2010/main">
+    <mc:Choice Requires="p14">
+      <p:transition spd="med" p14:dur="700">
+        <p:fade/>
+      </p:transition>
+    </mc:Choice>
+    <mc:Fallback xmlns="">
+      <p:transition spd="med">
+        <p:fade/>
+      </p:transition>
+    </mc:Fallback>
+  </mc:AlternateContent>
+</p:sld>
+</file>
+
+<file path=ppt/slides/slide5.xml><?xml version="1.0" encoding="utf-8"?>
+<p:sld xmlns:a="http://schemas.openxmlformats.org/drawingml/2006/main" xmlns:r="http://schemas.openxmlformats.org/officeDocument/2006/relationships" xmlns:p="http://schemas.openxmlformats.org/presentationml/2006/main">
+  <p:cSld>
+    <p:spTree>
+      <p:nvGrpSpPr>
+        <p:cNvPr id="1" name=""/>
+        <p:cNvGrpSpPr/>
+        <p:nvPr/>
+      </p:nvGrpSpPr>
+      <p:grpSpPr>
+        <a:xfrm>
+          <a:off x="0" y="0"/>
+          <a:ext cx="0" cy="0"/>
+          <a:chOff x="0" y="0"/>
+          <a:chExt cx="0" cy="0"/>
+        </a:xfrm>
+      </p:grpSpPr>
+      <p:sp>
+        <p:nvSpPr>
+          <p:cNvPr id="2" name="Title 1"/>
+          <p:cNvSpPr>
+            <a:spLocks noGrp="1"/>
+          </p:cNvSpPr>
+          <p:nvPr>
+            <p:ph type="title"/>
+          </p:nvPr>
+        </p:nvSpPr>
+        <p:spPr/>
+        <p:txBody>
+          <a:bodyPr/>
+          <a:lstStyle/>
+          <a:p>
+            <a:r>
+              <a:rPr lang="en-US" dirty="0" smtClean="0"/>
+              <a:t>Example…</a:t>
+            </a:r>
+            <a:endParaRPr lang="en-US" dirty="0"/>
+          </a:p>
+        </p:txBody>
+      </p:sp>
+      <p:pic>
+        <p:nvPicPr>
+          <p:cNvPr id="5" name="Picture 4"/>
+          <p:cNvPicPr>
+            <a:picLocks noChangeAspect="1"/>
+          </p:cNvPicPr>
+          <p:nvPr/>
+        </p:nvPicPr>
+        <p:blipFill>
+          <a:blip r:embed="rId2"/>
+          <a:stretch>
+            <a:fillRect/>
+          </a:stretch>
+        </p:blipFill>
+        <p:spPr>
+          <a:xfrm>
+            <a:off x="4570412" y="228600"/>
+            <a:ext cx="7315200" cy="6425101"/>
+          </a:xfrm>
+          <a:prstGeom prst="rect">
+            <a:avLst/>
+          </a:prstGeom>
+        </p:spPr>
+      </p:pic>
+      <p:sp>
+        <p:nvSpPr>
+          <p:cNvPr id="6" name="TextBox 5"/>
+          <p:cNvSpPr txBox="1"/>
+          <p:nvPr/>
+        </p:nvSpPr>
+        <p:spPr>
+          <a:xfrm>
+            <a:off x="1292224" y="1600200"/>
+            <a:ext cx="3276600" cy="369332"/>
+          </a:xfrm>
+          <a:prstGeom prst="rect">
+            <a:avLst/>
+          </a:prstGeom>
+          <a:noFill/>
+        </p:spPr>
+        <p:txBody>
+          <a:bodyPr wrap="square" rtlCol="0">
+            <a:spAutoFit/>
+          </a:bodyPr>
+          <a:lstStyle/>
+          <a:p>
+            <a:r>
+              <a:rPr lang="en-US" dirty="0" smtClean="0"/>
+              <a:t>What would the output be?</a:t>
+            </a:r>
+            <a:endParaRPr lang="en-US" dirty="0"/>
+          </a:p>
+        </p:txBody>
+      </p:sp>
+    </p:spTree>
+    <p:extLst>
+      <p:ext uri="{BB962C8B-B14F-4D97-AF65-F5344CB8AC3E}">
+        <p14:creationId xmlns:p14="http://schemas.microsoft.com/office/powerpoint/2010/main" val="3669075216"/>
+      </p:ext>
+    </p:extLst>
+  </p:cSld>
+  <p:clrMapOvr>
+    <a:masterClrMapping/>
+  </p:clrMapOvr>
+  <mc:AlternateContent xmlns:mc="http://schemas.openxmlformats.org/markup-compatibility/2006" xmlns:p14="http://schemas.microsoft.com/office/powerpoint/2010/main">
+    <mc:Choice Requires="p14">
+      <p:transition spd="med" p14:dur="700">
+        <p:fade/>
+      </p:transition>
+    </mc:Choice>
+    <mc:Fallback xmlns="">
+      <p:transition spd="med">
+        <p:fade/>
+      </p:transition>
+    </mc:Fallback>
+  </mc:AlternateContent>
+</p:sld>
+</file>
+
 <file path=ppt/slides/slide6.xml><?xml version="1.0" encoding="utf-8"?>
 <p:sld xmlns:a="http://schemas.openxmlformats.org/drawingml/2006/main" xmlns:r="http://schemas.openxmlformats.org/officeDocument/2006/relationships" xmlns:p="http://schemas.openxmlformats.org/presentationml/2006/main">
   <p:cSld>
@@ -5282,7 +6281,7 @@
           <a:p>
             <a:r>
               <a:rPr lang="en-US" dirty="0" smtClean="0"/>
-              <a:t>Let’s Try it</a:t>
+              <a:t>Let’s try it…</a:t>
             </a:r>
             <a:endParaRPr lang="en-US" dirty="0"/>
           </a:p>
@@ -5305,37 +6304,53 @@
           <a:p>
             <a:r>
               <a:rPr lang="en-US" dirty="0" smtClean="0"/>
-              <a:t>Create a While loop that prints the numbers from 5 through 10</a:t>
-            </a:r>
-          </a:p>
-          <a:p>
-            <a:r>
-              <a:rPr lang="en-US" dirty="0" smtClean="0"/>
-              <a:t>Create a for loop that begins at 10 and decrements to the number 5</a:t>
-            </a:r>
-          </a:p>
-          <a:p>
-            <a:r>
-              <a:rPr lang="en-US" dirty="0" smtClean="0"/>
-              <a:t>Create a do while loop that starts at value 10 and increments to 16</a:t>
-            </a:r>
-          </a:p>
-          <a:p>
-            <a:r>
-              <a:rPr lang="en-US" dirty="0" smtClean="0"/>
-              <a:t>Create </a:t>
-            </a:r>
-            <a:r>
-              <a:rPr lang="en-US" smtClean="0"/>
-              <a:t>a while </a:t>
-            </a:r>
-            <a:r>
-              <a:rPr lang="en-US" dirty="0" smtClean="0"/>
-              <a:t>loop that </a:t>
-            </a:r>
-            <a:r>
-              <a:rPr lang="en-US" smtClean="0"/>
-              <a:t>is infinite and never quits (We will do this together!)</a:t>
+              <a:t>Find the minimum between two numbers</a:t>
+            </a:r>
+          </a:p>
+          <a:p>
+            <a:pPr lvl="1"/>
+            <a:r>
+              <a:rPr lang="en-US" dirty="0" smtClean="0"/>
+              <a:t>Create a method called </a:t>
+            </a:r>
+            <a:r>
+              <a:rPr lang="en-US" dirty="0" err="1" smtClean="0"/>
+              <a:t>minFunction</a:t>
+            </a:r>
+            <a:r>
+              <a:rPr lang="en-US" dirty="0" smtClean="0"/>
+              <a:t>(</a:t>
+            </a:r>
+            <a:r>
+              <a:rPr lang="en-US" dirty="0" err="1" smtClean="0"/>
+              <a:t>int</a:t>
+            </a:r>
+            <a:r>
+              <a:rPr lang="en-US" dirty="0" smtClean="0"/>
+              <a:t> n1, </a:t>
+            </a:r>
+            <a:r>
+              <a:rPr lang="en-US" dirty="0" err="1" smtClean="0"/>
+              <a:t>int</a:t>
+            </a:r>
+            <a:r>
+              <a:rPr lang="en-US" dirty="0" smtClean="0"/>
+              <a:t> n2)</a:t>
+            </a:r>
+          </a:p>
+          <a:p>
+            <a:pPr lvl="1"/>
+            <a:r>
+              <a:rPr lang="en-US" dirty="0" smtClean="0"/>
+              <a:t>Call the </a:t>
+            </a:r>
+            <a:r>
+              <a:rPr lang="en-US" dirty="0" err="1" smtClean="0"/>
+              <a:t>minFunction</a:t>
+            </a:r>
+            <a:r>
+              <a:rPr lang="en-US" dirty="0" smtClean="0"/>
+              <a:t>() inside the main method</a:t>
             </a:r>
             <a:endParaRPr lang="en-US" dirty="0"/>
           </a:p>
@@ -5344,7 +6359,7 @@
     </p:spTree>
     <p:extLst>
       <p:ext uri="{BB962C8B-B14F-4D97-AF65-F5344CB8AC3E}">
-        <p14:creationId xmlns:p14="http://schemas.microsoft.com/office/powerpoint/2010/main" val="1578329932"/>
+        <p14:creationId xmlns:p14="http://schemas.microsoft.com/office/powerpoint/2010/main" val="3502522397"/>
       </p:ext>
     </p:extLst>
   </p:cSld>
@@ -5393,144 +6408,444 @@
             <p:ph type="title"/>
           </p:nvPr>
         </p:nvSpPr>
-        <p:spPr/>
-        <p:txBody>
-          <a:bodyPr/>
+        <p:spPr>
+          <a:xfrm>
+            <a:off x="1269135" y="685800"/>
+            <a:ext cx="9601200" cy="1143000"/>
+          </a:xfrm>
+        </p:spPr>
+        <p:txBody>
+          <a:bodyPr>
+            <a:normAutofit fontScale="90000"/>
+          </a:bodyPr>
           <a:lstStyle/>
           <a:p>
             <a:r>
               <a:rPr lang="en-US" dirty="0" smtClean="0"/>
-              <a:t>Homework!</a:t>
-            </a:r>
+              <a:t/>
+            </a:r>
+            <a:br>
+              <a:rPr lang="en-US" dirty="0" smtClean="0"/>
+            </a:br>
+            <a:r>
+              <a:rPr lang="en-US" dirty="0"/>
+              <a:t/>
+            </a:r>
+            <a:br>
+              <a:rPr lang="en-US" dirty="0"/>
+            </a:br>
+            <a:r>
+              <a:rPr lang="en-US" dirty="0" smtClean="0"/>
+              <a:t/>
+            </a:r>
+            <a:br>
+              <a:rPr lang="en-US" dirty="0" smtClean="0"/>
+            </a:br>
+            <a:r>
+              <a:rPr lang="en-US" dirty="0" smtClean="0"/>
+              <a:t>Different kind of if loops – </a:t>
+            </a:r>
+            <a:br>
+              <a:rPr lang="en-US" dirty="0" smtClean="0"/>
+            </a:br>
+            <a:r>
+              <a:rPr lang="en-US" sz="6000" dirty="0" smtClean="0"/>
+              <a:t>switch statements</a:t>
+            </a:r>
+            <a:r>
+              <a:rPr lang="en-US" dirty="0" smtClean="0"/>
+              <a:t/>
+            </a:r>
+            <a:br>
+              <a:rPr lang="en-US" dirty="0" smtClean="0"/>
+            </a:br>
             <a:endParaRPr lang="en-US" dirty="0"/>
           </a:p>
         </p:txBody>
       </p:sp>
-      <p:sp>
-        <p:nvSpPr>
-          <p:cNvPr id="3" name="Content Placeholder 2"/>
-          <p:cNvSpPr>
-            <a:spLocks noGrp="1"/>
-          </p:cNvSpPr>
-          <p:nvPr>
-            <p:ph idx="1"/>
-          </p:nvPr>
-        </p:nvSpPr>
-        <p:spPr/>
-        <p:txBody>
-          <a:bodyPr/>
-          <a:lstStyle/>
-          <a:p>
-            <a:r>
-              <a:rPr lang="en-US" dirty="0" smtClean="0"/>
-              <a:t>Calculate the area of circle using user input</a:t>
-            </a:r>
-          </a:p>
-          <a:p>
-            <a:r>
-              <a:rPr lang="en-US" dirty="0" smtClean="0"/>
-              <a:t>Tip: </a:t>
-            </a:r>
-          </a:p>
-          <a:p>
-            <a:pPr lvl="1"/>
-            <a:r>
-              <a:rPr lang="en-US" dirty="0" smtClean="0"/>
-              <a:t>Use import </a:t>
-            </a:r>
-            <a:r>
-              <a:rPr lang="en-US" b="1" dirty="0" err="1" smtClean="0"/>
-              <a:t>java.util.Scanner</a:t>
-            </a:r>
-            <a:r>
-              <a:rPr lang="en-US" dirty="0" smtClean="0"/>
-              <a:t>;</a:t>
-            </a:r>
-          </a:p>
-          <a:p>
-            <a:pPr lvl="1"/>
-            <a:r>
-              <a:rPr lang="en-US" dirty="0" smtClean="0"/>
-              <a:t>Use </a:t>
-            </a:r>
-            <a:r>
-              <a:rPr lang="en-US" dirty="0" err="1" smtClean="0"/>
-              <a:t>Math.pow</a:t>
-            </a:r>
-            <a:r>
-              <a:rPr lang="en-US" dirty="0" smtClean="0"/>
-              <a:t>(</a:t>
-            </a:r>
-            <a:r>
-              <a:rPr lang="en-US" dirty="0" err="1" smtClean="0"/>
-              <a:t>a,b</a:t>
-            </a:r>
-            <a:r>
-              <a:rPr lang="en-US" dirty="0" smtClean="0"/>
-              <a:t>)</a:t>
-            </a:r>
-          </a:p>
-          <a:p>
-            <a:pPr lvl="2"/>
-            <a:r>
-              <a:rPr lang="en-US" dirty="0" smtClean="0"/>
-              <a:t>a = radius</a:t>
-            </a:r>
-          </a:p>
-          <a:p>
-            <a:pPr lvl="2"/>
-            <a:r>
-              <a:rPr lang="en-US" dirty="0" smtClean="0"/>
-              <a:t>b = power you want to raise it to</a:t>
-            </a:r>
-          </a:p>
-          <a:p>
-            <a:r>
-              <a:rPr lang="en-US" dirty="0" smtClean="0"/>
-              <a:t>Configuration Change to </a:t>
-            </a:r>
-            <a:r>
-              <a:rPr lang="en-US" dirty="0" err="1" smtClean="0"/>
-              <a:t>launch.json</a:t>
-            </a:r>
-            <a:r>
-              <a:rPr lang="en-US" dirty="0" smtClean="0"/>
-              <a:t> </a:t>
-            </a:r>
-          </a:p>
-          <a:p>
-            <a:pPr lvl="1"/>
-            <a:r>
-              <a:rPr lang="en-US" dirty="0" smtClean="0"/>
-              <a:t>Change “console”: for your class from “</a:t>
-            </a:r>
-            <a:r>
-              <a:rPr lang="en-US" dirty="0" err="1" smtClean="0"/>
-              <a:t>internalConsole</a:t>
-            </a:r>
-            <a:r>
-              <a:rPr lang="en-US" dirty="0" smtClean="0"/>
-              <a:t>” </a:t>
-            </a:r>
-            <a:r>
-              <a:rPr lang="en-US" dirty="0"/>
-              <a:t>to “</a:t>
-            </a:r>
-            <a:r>
-              <a:rPr lang="en-US" dirty="0" err="1" smtClean="0"/>
-              <a:t>integratedTerminal</a:t>
-            </a:r>
-            <a:r>
-              <a:rPr lang="en-US" dirty="0" smtClean="0"/>
-              <a:t>”</a:t>
-            </a:r>
-          </a:p>
-        </p:txBody>
-      </p:sp>
+      <p:pic>
+        <p:nvPicPr>
+          <p:cNvPr id="4" name="Picture 3"/>
+          <p:cNvPicPr>
+            <a:picLocks noChangeAspect="1"/>
+          </p:cNvPicPr>
+          <p:nvPr/>
+        </p:nvPicPr>
+        <p:blipFill>
+          <a:blip r:embed="rId2"/>
+          <a:stretch>
+            <a:fillRect/>
+          </a:stretch>
+        </p:blipFill>
+        <p:spPr>
+          <a:xfrm>
+            <a:off x="1370012" y="1524000"/>
+            <a:ext cx="4114800" cy="5087174"/>
+          </a:xfrm>
+          <a:prstGeom prst="rect">
+            <a:avLst/>
+          </a:prstGeom>
+        </p:spPr>
+      </p:pic>
+      <p:pic>
+        <p:nvPicPr>
+          <p:cNvPr id="6" name="Picture 5"/>
+          <p:cNvPicPr>
+            <a:picLocks noChangeAspect="1"/>
+          </p:cNvPicPr>
+          <p:nvPr/>
+        </p:nvPicPr>
+        <p:blipFill>
+          <a:blip r:embed="rId3"/>
+          <a:stretch>
+            <a:fillRect/>
+          </a:stretch>
+        </p:blipFill>
+        <p:spPr>
+          <a:xfrm>
+            <a:off x="5789611" y="1524000"/>
+            <a:ext cx="5762003" cy="5087174"/>
+          </a:xfrm>
+          <a:prstGeom prst="rect">
+            <a:avLst/>
+          </a:prstGeom>
+        </p:spPr>
+      </p:pic>
     </p:spTree>
     <p:extLst>
       <p:ext uri="{BB962C8B-B14F-4D97-AF65-F5344CB8AC3E}">
-        <p14:creationId xmlns:p14="http://schemas.microsoft.com/office/powerpoint/2010/main" val="750517101"/>
+        <p14:creationId xmlns:p14="http://schemas.microsoft.com/office/powerpoint/2010/main" val="1018311597"/>
+      </p:ext>
+    </p:extLst>
+  </p:cSld>
+  <p:clrMapOvr>
+    <a:masterClrMapping/>
+  </p:clrMapOvr>
+  <mc:AlternateContent xmlns:mc="http://schemas.openxmlformats.org/markup-compatibility/2006" xmlns:p14="http://schemas.microsoft.com/office/powerpoint/2010/main">
+    <mc:Choice Requires="p14">
+      <p:transition spd="med" p14:dur="700">
+        <p:fade/>
+      </p:transition>
+    </mc:Choice>
+    <mc:Fallback xmlns="">
+      <p:transition spd="med">
+        <p:fade/>
+      </p:transition>
+    </mc:Fallback>
+  </mc:AlternateContent>
+</p:sld>
+</file>
+
+<file path=ppt/slides/slide8.xml><?xml version="1.0" encoding="utf-8"?>
+<p:sld xmlns:a="http://schemas.openxmlformats.org/drawingml/2006/main" xmlns:r="http://schemas.openxmlformats.org/officeDocument/2006/relationships" xmlns:p="http://schemas.openxmlformats.org/presentationml/2006/main">
+  <p:cSld>
+    <p:spTree>
+      <p:nvGrpSpPr>
+        <p:cNvPr id="1" name=""/>
+        <p:cNvGrpSpPr/>
+        <p:nvPr/>
+      </p:nvGrpSpPr>
+      <p:grpSpPr>
+        <a:xfrm>
+          <a:off x="0" y="0"/>
+          <a:ext cx="0" cy="0"/>
+          <a:chOff x="0" y="0"/>
+          <a:chExt cx="0" cy="0"/>
+        </a:xfrm>
+      </p:grpSpPr>
+      <p:sp>
+        <p:nvSpPr>
+          <p:cNvPr id="2" name="Title 1"/>
+          <p:cNvSpPr>
+            <a:spLocks noGrp="1"/>
+          </p:cNvSpPr>
+          <p:nvPr>
+            <p:ph type="title"/>
+          </p:nvPr>
+        </p:nvSpPr>
+        <p:spPr/>
+        <p:txBody>
+          <a:bodyPr/>
+          <a:lstStyle/>
+          <a:p>
+            <a:r>
+              <a:rPr lang="en-US" dirty="0" smtClean="0"/>
+              <a:t>Switch Statement rules:</a:t>
+            </a:r>
+            <a:endParaRPr lang="en-US" dirty="0"/>
+          </a:p>
+        </p:txBody>
+      </p:sp>
+      <p:sp>
+        <p:nvSpPr>
+          <p:cNvPr id="3" name="Content Placeholder 2"/>
+          <p:cNvSpPr>
+            <a:spLocks noGrp="1"/>
+          </p:cNvSpPr>
+          <p:nvPr>
+            <p:ph idx="1"/>
+          </p:nvPr>
+        </p:nvSpPr>
+        <p:spPr>
+          <a:xfrm>
+            <a:off x="1293814" y="1828800"/>
+            <a:ext cx="10058398" cy="4724400"/>
+          </a:xfrm>
+        </p:spPr>
+        <p:txBody>
+          <a:bodyPr>
+            <a:normAutofit fontScale="85000" lnSpcReduction="20000"/>
+          </a:bodyPr>
+          <a:lstStyle/>
+          <a:p>
+            <a:r>
+              <a:rPr lang="en-US" dirty="0" smtClean="0"/>
+              <a:t>The </a:t>
+            </a:r>
+            <a:r>
+              <a:rPr lang="en-US" dirty="0"/>
+              <a:t>variable used in a switch statement can only be integers, </a:t>
+            </a:r>
+            <a:r>
+              <a:rPr lang="en-US" dirty="0" smtClean="0"/>
+              <a:t>convertible </a:t>
+            </a:r>
+            <a:r>
+              <a:rPr lang="en-US" dirty="0"/>
+              <a:t>integers (byte, short, char), strings and </a:t>
+            </a:r>
+            <a:r>
+              <a:rPr lang="en-US" dirty="0" err="1" smtClean="0"/>
+              <a:t>Enums</a:t>
+            </a:r>
+            <a:r>
+              <a:rPr lang="en-US" dirty="0" smtClean="0"/>
+              <a:t>.</a:t>
+            </a:r>
+            <a:endParaRPr lang="en-US" dirty="0"/>
+          </a:p>
+          <a:p>
+            <a:r>
+              <a:rPr lang="en-US" dirty="0"/>
+              <a:t>You can have any number of case statements within a switch. Each case is followed by the value to be compared to and a colon.</a:t>
+            </a:r>
+          </a:p>
+          <a:p>
+            <a:r>
+              <a:rPr lang="en-US" dirty="0"/>
+              <a:t>The value for a case must be the same data type as the variable in the switch and it must be a constant or a literal.</a:t>
+            </a:r>
+          </a:p>
+          <a:p>
+            <a:r>
+              <a:rPr lang="en-US" dirty="0"/>
+              <a:t>When the variable being switched on is equal to a case, the statements following that case will execute until a </a:t>
+            </a:r>
+            <a:r>
+              <a:rPr lang="en-US" i="1" dirty="0"/>
+              <a:t>break</a:t>
+            </a:r>
+            <a:r>
+              <a:rPr lang="en-US" dirty="0"/>
+              <a:t> statement is reached.</a:t>
+            </a:r>
+          </a:p>
+          <a:p>
+            <a:r>
+              <a:rPr lang="en-US" dirty="0"/>
+              <a:t>When a </a:t>
+            </a:r>
+            <a:r>
+              <a:rPr lang="en-US" i="1" dirty="0"/>
+              <a:t>break</a:t>
+            </a:r>
+            <a:r>
+              <a:rPr lang="en-US" dirty="0"/>
+              <a:t> statement is reached, the switch terminates, and the flow of control jumps to the next line following the switch statement.</a:t>
+            </a:r>
+          </a:p>
+          <a:p>
+            <a:r>
+              <a:rPr lang="en-US" dirty="0"/>
+              <a:t>Not every case needs to contain a break. If no break appears, the flow of control will </a:t>
+            </a:r>
+            <a:r>
+              <a:rPr lang="en-US" i="1" dirty="0"/>
+              <a:t>fall through </a:t>
+            </a:r>
+            <a:r>
+              <a:rPr lang="en-US" dirty="0"/>
+              <a:t>to subsequent cases until a break is reached.</a:t>
+            </a:r>
+          </a:p>
+          <a:p>
+            <a:r>
+              <a:rPr lang="en-US" dirty="0"/>
+              <a:t>A </a:t>
+            </a:r>
+            <a:r>
+              <a:rPr lang="en-US" i="1" dirty="0"/>
+              <a:t>switch</a:t>
+            </a:r>
+            <a:r>
+              <a:rPr lang="en-US" dirty="0"/>
+              <a:t> statement can have an optional default case, which must appear at the end of the switch. The default case can be used for performing a task when none of the cases is true. No break is needed in the default case.</a:t>
+            </a:r>
+          </a:p>
+          <a:p>
+            <a:endParaRPr lang="en-US" dirty="0"/>
+          </a:p>
+        </p:txBody>
+      </p:sp>
+    </p:spTree>
+    <p:extLst>
+      <p:ext uri="{BB962C8B-B14F-4D97-AF65-F5344CB8AC3E}">
+        <p14:creationId xmlns:p14="http://schemas.microsoft.com/office/powerpoint/2010/main" val="3115162928"/>
+      </p:ext>
+    </p:extLst>
+  </p:cSld>
+  <p:clrMapOvr>
+    <a:masterClrMapping/>
+  </p:clrMapOvr>
+  <mc:AlternateContent xmlns:mc="http://schemas.openxmlformats.org/markup-compatibility/2006" xmlns:p14="http://schemas.microsoft.com/office/powerpoint/2010/main">
+    <mc:Choice Requires="p14">
+      <p:transition spd="med" p14:dur="700">
+        <p:fade/>
+      </p:transition>
+    </mc:Choice>
+    <mc:Fallback xmlns="">
+      <p:transition spd="med">
+        <p:fade/>
+      </p:transition>
+    </mc:Fallback>
+  </mc:AlternateContent>
+</p:sld>
+</file>
+
+<file path=ppt/slides/slide9.xml><?xml version="1.0" encoding="utf-8"?>
+<p:sld xmlns:a="http://schemas.openxmlformats.org/drawingml/2006/main" xmlns:r="http://schemas.openxmlformats.org/officeDocument/2006/relationships" xmlns:p="http://schemas.openxmlformats.org/presentationml/2006/main">
+  <p:cSld>
+    <p:spTree>
+      <p:nvGrpSpPr>
+        <p:cNvPr id="1" name=""/>
+        <p:cNvGrpSpPr/>
+        <p:nvPr/>
+      </p:nvGrpSpPr>
+      <p:grpSpPr>
+        <a:xfrm>
+          <a:off x="0" y="0"/>
+          <a:ext cx="0" cy="0"/>
+          <a:chOff x="0" y="0"/>
+          <a:chExt cx="0" cy="0"/>
+        </a:xfrm>
+      </p:grpSpPr>
+      <p:sp>
+        <p:nvSpPr>
+          <p:cNvPr id="2" name="Title 1"/>
+          <p:cNvSpPr>
+            <a:spLocks noGrp="1"/>
+          </p:cNvSpPr>
+          <p:nvPr>
+            <p:ph type="title"/>
+          </p:nvPr>
+        </p:nvSpPr>
+        <p:spPr/>
+        <p:txBody>
+          <a:bodyPr/>
+          <a:lstStyle/>
+          <a:p>
+            <a:r>
+              <a:rPr lang="en-US" dirty="0" smtClean="0"/>
+              <a:t>Let’s Try it…</a:t>
+            </a:r>
+            <a:endParaRPr lang="en-US" dirty="0"/>
+          </a:p>
+        </p:txBody>
+      </p:sp>
+      <p:sp>
+        <p:nvSpPr>
+          <p:cNvPr id="3" name="Content Placeholder 2"/>
+          <p:cNvSpPr>
+            <a:spLocks noGrp="1"/>
+          </p:cNvSpPr>
+          <p:nvPr>
+            <p:ph idx="1"/>
+          </p:nvPr>
+        </p:nvSpPr>
+        <p:spPr/>
+        <p:txBody>
+          <a:bodyPr/>
+          <a:lstStyle/>
+          <a:p>
+            <a:r>
+              <a:rPr lang="en-US" dirty="0" smtClean="0"/>
+              <a:t>I got a </a:t>
+            </a:r>
+            <a:r>
+              <a:rPr lang="en-US" dirty="0" err="1" smtClean="0"/>
+              <a:t>a</a:t>
+            </a:r>
+            <a:r>
+              <a:rPr lang="en-US" dirty="0" smtClean="0"/>
+              <a:t> ‘C-’, on my Math Test. Print a statement that tells me how I did on their Math Test. </a:t>
+            </a:r>
+          </a:p>
+          <a:p>
+            <a:pPr lvl="1"/>
+            <a:r>
+              <a:rPr lang="en-US" dirty="0" smtClean="0"/>
+              <a:t>For example </a:t>
+            </a:r>
+          </a:p>
+          <a:p>
+            <a:pPr lvl="2"/>
+            <a:r>
+              <a:rPr lang="en-US" dirty="0" smtClean="0"/>
+              <a:t>A – Excellent</a:t>
+            </a:r>
+          </a:p>
+          <a:p>
+            <a:pPr lvl="2"/>
+            <a:r>
+              <a:rPr lang="en-US" dirty="0" smtClean="0"/>
+              <a:t>A- – Well Done</a:t>
+            </a:r>
+          </a:p>
+          <a:p>
+            <a:pPr lvl="2"/>
+            <a:r>
+              <a:rPr lang="en-US" dirty="0" smtClean="0"/>
+              <a:t>B+ – Close, but NO!</a:t>
+            </a:r>
+          </a:p>
+          <a:p>
+            <a:pPr lvl="2"/>
+            <a:r>
+              <a:rPr lang="en-US" dirty="0" smtClean="0"/>
+              <a:t>B – Better Try again!</a:t>
+            </a:r>
+          </a:p>
+          <a:p>
+            <a:pPr lvl="2"/>
+            <a:r>
+              <a:rPr lang="en-US" dirty="0" smtClean="0"/>
+              <a:t>B- - You Failed!  </a:t>
+            </a:r>
+          </a:p>
+          <a:p>
+            <a:pPr lvl="2"/>
+            <a:r>
+              <a:rPr lang="en-US" dirty="0" smtClean="0"/>
+              <a:t>…</a:t>
+            </a:r>
+            <a:endParaRPr lang="en-US" dirty="0"/>
+          </a:p>
+        </p:txBody>
+      </p:sp>
+    </p:spTree>
+    <p:extLst>
+      <p:ext uri="{BB962C8B-B14F-4D97-AF65-F5344CB8AC3E}">
+        <p14:creationId xmlns:p14="http://schemas.microsoft.com/office/powerpoint/2010/main" val="32651528"/>
       </p:ext>
     </p:extLst>
   </p:cSld>
@@ -6215,141 +7530,6 @@
 </file>
 
 <file path=customXml/item1.xml><?xml version="1.0" encoding="utf-8"?>
-<p:properties xmlns:p="http://schemas.microsoft.com/office/2006/metadata/properties" xmlns:xsi="http://www.w3.org/2001/XMLSchema-instance" xmlns:pc="http://schemas.microsoft.com/office/infopath/2007/PartnerControls">
-  <documentManagement>
-    <DirectSourceMarket xmlns="4873beb7-5857-4685-be1f-d57550cc96cc" xsi:nil="true"/>
-    <ApprovalStatus xmlns="4873beb7-5857-4685-be1f-d57550cc96cc">InProgress</ApprovalStatus>
-    <MarketSpecific xmlns="4873beb7-5857-4685-be1f-d57550cc96cc">false</MarketSpecific>
-    <LocComments xmlns="4873beb7-5857-4685-be1f-d57550cc96cc" xsi:nil="true"/>
-    <ThumbnailAssetId xmlns="4873beb7-5857-4685-be1f-d57550cc96cc" xsi:nil="true"/>
-    <PrimaryImageGen xmlns="4873beb7-5857-4685-be1f-d57550cc96cc">false</PrimaryImageGen>
-    <LegacyData xmlns="4873beb7-5857-4685-be1f-d57550cc96cc" xsi:nil="true"/>
-    <LocRecommendedHandoff xmlns="4873beb7-5857-4685-be1f-d57550cc96cc" xsi:nil="true"/>
-    <BusinessGroup xmlns="4873beb7-5857-4685-be1f-d57550cc96cc" xsi:nil="true"/>
-    <BlockPublish xmlns="4873beb7-5857-4685-be1f-d57550cc96cc">false</BlockPublish>
-    <TPFriendlyName xmlns="4873beb7-5857-4685-be1f-d57550cc96cc" xsi:nil="true"/>
-    <NumericId xmlns="4873beb7-5857-4685-be1f-d57550cc96cc" xsi:nil="true"/>
-    <APEditor xmlns="4873beb7-5857-4685-be1f-d57550cc96cc">
-      <UserInfo>
-        <DisplayName/>
-        <AccountId xsi:nil="true"/>
-        <AccountType/>
-      </UserInfo>
-    </APEditor>
-    <SourceTitle xmlns="4873beb7-5857-4685-be1f-d57550cc96cc" xsi:nil="true"/>
-    <OpenTemplate xmlns="4873beb7-5857-4685-be1f-d57550cc96cc">true</OpenTemplate>
-    <UALocComments xmlns="4873beb7-5857-4685-be1f-d57550cc96cc" xsi:nil="true"/>
-    <ParentAssetId xmlns="4873beb7-5857-4685-be1f-d57550cc96cc" xsi:nil="true"/>
-    <IntlLangReviewDate xmlns="4873beb7-5857-4685-be1f-d57550cc96cc" xsi:nil="true"/>
-    <FeatureTagsTaxHTField0 xmlns="4873beb7-5857-4685-be1f-d57550cc96cc">
-      <Terms xmlns="http://schemas.microsoft.com/office/infopath/2007/PartnerControls"/>
-    </FeatureTagsTaxHTField0>
-    <PublishStatusLookup xmlns="4873beb7-5857-4685-be1f-d57550cc96cc">
-      <Value>1360511</Value>
-    </PublishStatusLookup>
-    <Providers xmlns="4873beb7-5857-4685-be1f-d57550cc96cc" xsi:nil="true"/>
-    <MachineTranslated xmlns="4873beb7-5857-4685-be1f-d57550cc96cc">false</MachineTranslated>
-    <OriginalSourceMarket xmlns="4873beb7-5857-4685-be1f-d57550cc96cc" xsi:nil="true"/>
-    <APDescription xmlns="4873beb7-5857-4685-be1f-d57550cc96cc" xsi:nil="true"/>
-    <ClipArtFilename xmlns="4873beb7-5857-4685-be1f-d57550cc96cc" xsi:nil="true"/>
-    <ContentItem xmlns="4873beb7-5857-4685-be1f-d57550cc96cc" xsi:nil="true"/>
-    <TPInstallLocation xmlns="4873beb7-5857-4685-be1f-d57550cc96cc" xsi:nil="true"/>
-    <PublishTargets xmlns="4873beb7-5857-4685-be1f-d57550cc96cc">OfficeOnlineVNext</PublishTargets>
-    <TimesCloned xmlns="4873beb7-5857-4685-be1f-d57550cc96cc" xsi:nil="true"/>
-    <AssetStart xmlns="4873beb7-5857-4685-be1f-d57550cc96cc">2011-12-12T13:37:00+00:00</AssetStart>
-    <Provider xmlns="4873beb7-5857-4685-be1f-d57550cc96cc" xsi:nil="true"/>
-    <AcquiredFrom xmlns="4873beb7-5857-4685-be1f-d57550cc96cc">Internal MS</AcquiredFrom>
-    <FriendlyTitle xmlns="4873beb7-5857-4685-be1f-d57550cc96cc" xsi:nil="true"/>
-    <LastHandOff xmlns="4873beb7-5857-4685-be1f-d57550cc96cc" xsi:nil="true"/>
-    <TPClientViewer xmlns="4873beb7-5857-4685-be1f-d57550cc96cc" xsi:nil="true"/>
-    <UACurrentWords xmlns="4873beb7-5857-4685-be1f-d57550cc96cc" xsi:nil="true"/>
-    <ArtSampleDocs xmlns="4873beb7-5857-4685-be1f-d57550cc96cc" xsi:nil="true"/>
-    <UALocRecommendation xmlns="4873beb7-5857-4685-be1f-d57550cc96cc">Localize</UALocRecommendation>
-    <Manager xmlns="4873beb7-5857-4685-be1f-d57550cc96cc" xsi:nil="true"/>
-    <ShowIn xmlns="4873beb7-5857-4685-be1f-d57550cc96cc">Show everywhere</ShowIn>
-    <UANotes xmlns="4873beb7-5857-4685-be1f-d57550cc96cc" xsi:nil="true"/>
-    <TemplateStatus xmlns="4873beb7-5857-4685-be1f-d57550cc96cc">Complete</TemplateStatus>
-    <InternalTagsTaxHTField0 xmlns="4873beb7-5857-4685-be1f-d57550cc96cc">
-      <Terms xmlns="http://schemas.microsoft.com/office/infopath/2007/PartnerControls"/>
-    </InternalTagsTaxHTField0>
-    <CSXHash xmlns="4873beb7-5857-4685-be1f-d57550cc96cc" xsi:nil="true"/>
-    <Downloads xmlns="4873beb7-5857-4685-be1f-d57550cc96cc">0</Downloads>
-    <VoteCount xmlns="4873beb7-5857-4685-be1f-d57550cc96cc" xsi:nil="true"/>
-    <OOCacheId xmlns="4873beb7-5857-4685-be1f-d57550cc96cc" xsi:nil="true"/>
-    <IsDeleted xmlns="4873beb7-5857-4685-be1f-d57550cc96cc">false</IsDeleted>
-    <AssetExpire xmlns="4873beb7-5857-4685-be1f-d57550cc96cc">2035-01-01T08:00:00+00:00</AssetExpire>
-    <DSATActionTaken xmlns="4873beb7-5857-4685-be1f-d57550cc96cc" xsi:nil="true"/>
-    <CSXSubmissionMarket xmlns="4873beb7-5857-4685-be1f-d57550cc96cc" xsi:nil="true"/>
-    <TPExecutable xmlns="4873beb7-5857-4685-be1f-d57550cc96cc" xsi:nil="true"/>
-    <SubmitterId xmlns="4873beb7-5857-4685-be1f-d57550cc96cc" xsi:nil="true"/>
-    <EditorialTags xmlns="4873beb7-5857-4685-be1f-d57550cc96cc" xsi:nil="true"/>
-    <ApprovalLog xmlns="4873beb7-5857-4685-be1f-d57550cc96cc" xsi:nil="true"/>
-    <AssetType xmlns="4873beb7-5857-4685-be1f-d57550cc96cc">TP</AssetType>
-    <BugNumber xmlns="4873beb7-5857-4685-be1f-d57550cc96cc" xsi:nil="true"/>
-    <CSXSubmissionDate xmlns="4873beb7-5857-4685-be1f-d57550cc96cc" xsi:nil="true"/>
-    <CSXUpdate xmlns="4873beb7-5857-4685-be1f-d57550cc96cc">false</CSXUpdate>
-    <Milestone xmlns="4873beb7-5857-4685-be1f-d57550cc96cc" xsi:nil="true"/>
-    <RecommendationsModifier xmlns="4873beb7-5857-4685-be1f-d57550cc96cc" xsi:nil="true"/>
-    <OriginAsset xmlns="4873beb7-5857-4685-be1f-d57550cc96cc" xsi:nil="true"/>
-    <TPComponent xmlns="4873beb7-5857-4685-be1f-d57550cc96cc" xsi:nil="true"/>
-    <AssetId xmlns="4873beb7-5857-4685-be1f-d57550cc96cc">TP102801114</AssetId>
-    <IntlLocPriority xmlns="4873beb7-5857-4685-be1f-d57550cc96cc" xsi:nil="true"/>
-    <PolicheckWords xmlns="4873beb7-5857-4685-be1f-d57550cc96cc" xsi:nil="true"/>
-    <TPLaunchHelpLink xmlns="4873beb7-5857-4685-be1f-d57550cc96cc" xsi:nil="true"/>
-    <TPApplication xmlns="4873beb7-5857-4685-be1f-d57550cc96cc" xsi:nil="true"/>
-    <CrawlForDependencies xmlns="4873beb7-5857-4685-be1f-d57550cc96cc">false</CrawlForDependencies>
-    <HandoffToMSDN xmlns="4873beb7-5857-4685-be1f-d57550cc96cc" xsi:nil="true"/>
-    <PlannedPubDate xmlns="4873beb7-5857-4685-be1f-d57550cc96cc" xsi:nil="true"/>
-    <IntlLangReviewer xmlns="4873beb7-5857-4685-be1f-d57550cc96cc" xsi:nil="true"/>
-    <TrustLevel xmlns="4873beb7-5857-4685-be1f-d57550cc96cc">1 Microsoft Managed Content</TrustLevel>
-    <LocLastLocAttemptVersionLookup xmlns="4873beb7-5857-4685-be1f-d57550cc96cc">706531</LocLastLocAttemptVersionLookup>
-    <IsSearchable xmlns="4873beb7-5857-4685-be1f-d57550cc96cc">true</IsSearchable>
-    <TemplateTemplateType xmlns="4873beb7-5857-4685-be1f-d57550cc96cc">PowerPoint Presentation Template</TemplateTemplateType>
-    <CampaignTagsTaxHTField0 xmlns="4873beb7-5857-4685-be1f-d57550cc96cc">
-      <Terms xmlns="http://schemas.microsoft.com/office/infopath/2007/PartnerControls"/>
-    </CampaignTagsTaxHTField0>
-    <TPNamespace xmlns="4873beb7-5857-4685-be1f-d57550cc96cc" xsi:nil="true"/>
-    <TaxCatchAll xmlns="4873beb7-5857-4685-be1f-d57550cc96cc"/>
-    <Markets xmlns="4873beb7-5857-4685-be1f-d57550cc96cc"/>
-    <UAProjectedTotalWords xmlns="4873beb7-5857-4685-be1f-d57550cc96cc" xsi:nil="true"/>
-    <IntlLangReview xmlns="4873beb7-5857-4685-be1f-d57550cc96cc">false</IntlLangReview>
-    <OutputCachingOn xmlns="4873beb7-5857-4685-be1f-d57550cc96cc">false</OutputCachingOn>
-    <AverageRating xmlns="4873beb7-5857-4685-be1f-d57550cc96cc" xsi:nil="true"/>
-    <APAuthor xmlns="4873beb7-5857-4685-be1f-d57550cc96cc">
-      <UserInfo>
-        <DisplayName>REDMOND\v-soujap</DisplayName>
-        <AccountId>1954</AccountId>
-        <AccountType/>
-      </UserInfo>
-    </APAuthor>
-    <LocManualTestRequired xmlns="4873beb7-5857-4685-be1f-d57550cc96cc">false</LocManualTestRequired>
-    <TPCommandLine xmlns="4873beb7-5857-4685-be1f-d57550cc96cc" xsi:nil="true"/>
-    <TPAppVersion xmlns="4873beb7-5857-4685-be1f-d57550cc96cc" xsi:nil="true"/>
-    <EditorialStatus xmlns="4873beb7-5857-4685-be1f-d57550cc96cc">Complete</EditorialStatus>
-    <LastModifiedDateTime xmlns="4873beb7-5857-4685-be1f-d57550cc96cc" xsi:nil="true"/>
-    <ScenarioTagsTaxHTField0 xmlns="4873beb7-5857-4685-be1f-d57550cc96cc">
-      <Terms xmlns="http://schemas.microsoft.com/office/infopath/2007/PartnerControls"/>
-    </ScenarioTagsTaxHTField0>
-    <OriginalRelease xmlns="4873beb7-5857-4685-be1f-d57550cc96cc">14</OriginalRelease>
-    <TPLaunchHelpLinkType xmlns="4873beb7-5857-4685-be1f-d57550cc96cc">Template</TPLaunchHelpLinkType>
-    <LocalizationTagsTaxHTField0 xmlns="4873beb7-5857-4685-be1f-d57550cc96cc">
-      <Terms xmlns="http://schemas.microsoft.com/office/infopath/2007/PartnerControls"/>
-    </LocalizationTagsTaxHTField0>
-    <LocMarketGroupTiers2 xmlns="4873beb7-5857-4685-be1f-d57550cc96cc" xsi:nil="true"/>
-  </documentManagement>
-</p:properties>
-</file>
-
-<file path=customXml/item2.xml><?xml version="1.0" encoding="utf-8"?>
-<?mso-contentType ?>
-<FormTemplates xmlns="http://schemas.microsoft.com/sharepoint/v3/contenttype/forms">
-  <Display>DocumentLibraryForm</Display>
-  <Edit>AssetEditForm</Edit>
-  <New>DocumentLibraryForm</New>
-</FormTemplates>
-</file>
-
-<file path=customXml/item3.xml><?xml version="1.0" encoding="utf-8"?>
 <ct:contentTypeSchema xmlns:ct="http://schemas.microsoft.com/office/2006/metadata/contentType" xmlns:ma="http://schemas.microsoft.com/office/2006/metadata/properties/metaAttributes" ct:_="" ma:_="" ma:contentTypeName="TemplateFile" ma:contentTypeID="0x0101006EDDDB5EE6D98C44930B742096920B300400F5B6D36B3EF94B4E9A635CDF2A18F5B8" ma:contentTypeVersion="72" ma:contentTypeDescription="Create a new document." ma:contentTypeScope="" ma:versionID="a23e56308344d904b51738559c3d67c9">
   <xsd:schema xmlns:xsd="http://www.w3.org/2001/XMLSchema" xmlns:xs="http://www.w3.org/2001/XMLSchema" xmlns:p="http://schemas.microsoft.com/office/2006/metadata/properties" xmlns:ns2="4873beb7-5857-4685-be1f-d57550cc96cc" targetNamespace="http://schemas.microsoft.com/office/2006/metadata/properties" ma:root="true" ma:fieldsID="cd0908cc4600e77bf5da051303e00c8d" ns2:_="">
     <xsd:import namespace="4873beb7-5857-4685-be1f-d57550cc96cc"/>
@@ -7389,31 +8569,142 @@
 </ct:contentTypeSchema>
 </file>
 
-<file path=customXml/itemProps1.xml><?xml version="1.0" encoding="utf-8"?>
-<ds:datastoreItem xmlns:ds="http://schemas.openxmlformats.org/officeDocument/2006/customXml" ds:itemID="{C335E791-7449-4708-8DE9-182EC4D8A134}">
-  <ds:schemaRefs>
-    <ds:schemaRef ds:uri="4873beb7-5857-4685-be1f-d57550cc96cc"/>
-    <ds:schemaRef ds:uri="http://purl.org/dc/elements/1.1/"/>
-    <ds:schemaRef ds:uri="http://schemas.microsoft.com/office/2006/metadata/properties"/>
-    <ds:schemaRef ds:uri="http://schemas.microsoft.com/office/infopath/2007/PartnerControls"/>
-    <ds:schemaRef ds:uri="http://purl.org/dc/terms/"/>
-    <ds:schemaRef ds:uri="http://schemas.microsoft.com/office/2006/documentManagement/types"/>
-    <ds:schemaRef ds:uri="http://schemas.openxmlformats.org/package/2006/metadata/core-properties"/>
-    <ds:schemaRef ds:uri="http://www.w3.org/XML/1998/namespace"/>
-    <ds:schemaRef ds:uri="http://purl.org/dc/dcmitype/"/>
-  </ds:schemaRefs>
-</ds:datastoreItem>
+<file path=customXml/item2.xml><?xml version="1.0" encoding="utf-8"?>
+<?mso-contentType ?>
+<FormTemplates xmlns="http://schemas.microsoft.com/sharepoint/v3/contenttype/forms">
+  <Display>DocumentLibraryForm</Display>
+  <Edit>AssetEditForm</Edit>
+  <New>DocumentLibraryForm</New>
+</FormTemplates>
 </file>
 
-<file path=customXml/itemProps2.xml><?xml version="1.0" encoding="utf-8"?>
-<ds:datastoreItem xmlns:ds="http://schemas.openxmlformats.org/officeDocument/2006/customXml" ds:itemID="{3C20563B-C646-42AF-9D0D-76DF086793C3}">
-  <ds:schemaRefs>
-    <ds:schemaRef ds:uri="http://schemas.microsoft.com/sharepoint/v3/contenttype/forms"/>
-  </ds:schemaRefs>
-</ds:datastoreItem>
+<file path=customXml/item3.xml><?xml version="1.0" encoding="utf-8"?>
+<p:properties xmlns:p="http://schemas.microsoft.com/office/2006/metadata/properties" xmlns:xsi="http://www.w3.org/2001/XMLSchema-instance" xmlns:pc="http://schemas.microsoft.com/office/infopath/2007/PartnerControls">
+  <documentManagement>
+    <DirectSourceMarket xmlns="4873beb7-5857-4685-be1f-d57550cc96cc" xsi:nil="true"/>
+    <ApprovalStatus xmlns="4873beb7-5857-4685-be1f-d57550cc96cc">InProgress</ApprovalStatus>
+    <MarketSpecific xmlns="4873beb7-5857-4685-be1f-d57550cc96cc">false</MarketSpecific>
+    <LocComments xmlns="4873beb7-5857-4685-be1f-d57550cc96cc" xsi:nil="true"/>
+    <ThumbnailAssetId xmlns="4873beb7-5857-4685-be1f-d57550cc96cc" xsi:nil="true"/>
+    <PrimaryImageGen xmlns="4873beb7-5857-4685-be1f-d57550cc96cc">false</PrimaryImageGen>
+    <LegacyData xmlns="4873beb7-5857-4685-be1f-d57550cc96cc" xsi:nil="true"/>
+    <LocRecommendedHandoff xmlns="4873beb7-5857-4685-be1f-d57550cc96cc" xsi:nil="true"/>
+    <BusinessGroup xmlns="4873beb7-5857-4685-be1f-d57550cc96cc" xsi:nil="true"/>
+    <BlockPublish xmlns="4873beb7-5857-4685-be1f-d57550cc96cc">false</BlockPublish>
+    <TPFriendlyName xmlns="4873beb7-5857-4685-be1f-d57550cc96cc" xsi:nil="true"/>
+    <NumericId xmlns="4873beb7-5857-4685-be1f-d57550cc96cc" xsi:nil="true"/>
+    <APEditor xmlns="4873beb7-5857-4685-be1f-d57550cc96cc">
+      <UserInfo>
+        <DisplayName/>
+        <AccountId xsi:nil="true"/>
+        <AccountType/>
+      </UserInfo>
+    </APEditor>
+    <SourceTitle xmlns="4873beb7-5857-4685-be1f-d57550cc96cc" xsi:nil="true"/>
+    <OpenTemplate xmlns="4873beb7-5857-4685-be1f-d57550cc96cc">true</OpenTemplate>
+    <UALocComments xmlns="4873beb7-5857-4685-be1f-d57550cc96cc" xsi:nil="true"/>
+    <ParentAssetId xmlns="4873beb7-5857-4685-be1f-d57550cc96cc" xsi:nil="true"/>
+    <IntlLangReviewDate xmlns="4873beb7-5857-4685-be1f-d57550cc96cc" xsi:nil="true"/>
+    <FeatureTagsTaxHTField0 xmlns="4873beb7-5857-4685-be1f-d57550cc96cc">
+      <Terms xmlns="http://schemas.microsoft.com/office/infopath/2007/PartnerControls"/>
+    </FeatureTagsTaxHTField0>
+    <PublishStatusLookup xmlns="4873beb7-5857-4685-be1f-d57550cc96cc">
+      <Value>1360511</Value>
+    </PublishStatusLookup>
+    <Providers xmlns="4873beb7-5857-4685-be1f-d57550cc96cc" xsi:nil="true"/>
+    <MachineTranslated xmlns="4873beb7-5857-4685-be1f-d57550cc96cc">false</MachineTranslated>
+    <OriginalSourceMarket xmlns="4873beb7-5857-4685-be1f-d57550cc96cc" xsi:nil="true"/>
+    <APDescription xmlns="4873beb7-5857-4685-be1f-d57550cc96cc" xsi:nil="true"/>
+    <ClipArtFilename xmlns="4873beb7-5857-4685-be1f-d57550cc96cc" xsi:nil="true"/>
+    <ContentItem xmlns="4873beb7-5857-4685-be1f-d57550cc96cc" xsi:nil="true"/>
+    <TPInstallLocation xmlns="4873beb7-5857-4685-be1f-d57550cc96cc" xsi:nil="true"/>
+    <PublishTargets xmlns="4873beb7-5857-4685-be1f-d57550cc96cc">OfficeOnlineVNext</PublishTargets>
+    <TimesCloned xmlns="4873beb7-5857-4685-be1f-d57550cc96cc" xsi:nil="true"/>
+    <AssetStart xmlns="4873beb7-5857-4685-be1f-d57550cc96cc">2011-12-12T13:37:00+00:00</AssetStart>
+    <Provider xmlns="4873beb7-5857-4685-be1f-d57550cc96cc" xsi:nil="true"/>
+    <AcquiredFrom xmlns="4873beb7-5857-4685-be1f-d57550cc96cc">Internal MS</AcquiredFrom>
+    <FriendlyTitle xmlns="4873beb7-5857-4685-be1f-d57550cc96cc" xsi:nil="true"/>
+    <LastHandOff xmlns="4873beb7-5857-4685-be1f-d57550cc96cc" xsi:nil="true"/>
+    <TPClientViewer xmlns="4873beb7-5857-4685-be1f-d57550cc96cc" xsi:nil="true"/>
+    <UACurrentWords xmlns="4873beb7-5857-4685-be1f-d57550cc96cc" xsi:nil="true"/>
+    <ArtSampleDocs xmlns="4873beb7-5857-4685-be1f-d57550cc96cc" xsi:nil="true"/>
+    <UALocRecommendation xmlns="4873beb7-5857-4685-be1f-d57550cc96cc">Localize</UALocRecommendation>
+    <Manager xmlns="4873beb7-5857-4685-be1f-d57550cc96cc" xsi:nil="true"/>
+    <ShowIn xmlns="4873beb7-5857-4685-be1f-d57550cc96cc">Show everywhere</ShowIn>
+    <UANotes xmlns="4873beb7-5857-4685-be1f-d57550cc96cc" xsi:nil="true"/>
+    <TemplateStatus xmlns="4873beb7-5857-4685-be1f-d57550cc96cc">Complete</TemplateStatus>
+    <InternalTagsTaxHTField0 xmlns="4873beb7-5857-4685-be1f-d57550cc96cc">
+      <Terms xmlns="http://schemas.microsoft.com/office/infopath/2007/PartnerControls"/>
+    </InternalTagsTaxHTField0>
+    <CSXHash xmlns="4873beb7-5857-4685-be1f-d57550cc96cc" xsi:nil="true"/>
+    <Downloads xmlns="4873beb7-5857-4685-be1f-d57550cc96cc">0</Downloads>
+    <VoteCount xmlns="4873beb7-5857-4685-be1f-d57550cc96cc" xsi:nil="true"/>
+    <OOCacheId xmlns="4873beb7-5857-4685-be1f-d57550cc96cc" xsi:nil="true"/>
+    <IsDeleted xmlns="4873beb7-5857-4685-be1f-d57550cc96cc">false</IsDeleted>
+    <AssetExpire xmlns="4873beb7-5857-4685-be1f-d57550cc96cc">2035-01-01T08:00:00+00:00</AssetExpire>
+    <DSATActionTaken xmlns="4873beb7-5857-4685-be1f-d57550cc96cc" xsi:nil="true"/>
+    <CSXSubmissionMarket xmlns="4873beb7-5857-4685-be1f-d57550cc96cc" xsi:nil="true"/>
+    <TPExecutable xmlns="4873beb7-5857-4685-be1f-d57550cc96cc" xsi:nil="true"/>
+    <SubmitterId xmlns="4873beb7-5857-4685-be1f-d57550cc96cc" xsi:nil="true"/>
+    <EditorialTags xmlns="4873beb7-5857-4685-be1f-d57550cc96cc" xsi:nil="true"/>
+    <ApprovalLog xmlns="4873beb7-5857-4685-be1f-d57550cc96cc" xsi:nil="true"/>
+    <AssetType xmlns="4873beb7-5857-4685-be1f-d57550cc96cc">TP</AssetType>
+    <BugNumber xmlns="4873beb7-5857-4685-be1f-d57550cc96cc" xsi:nil="true"/>
+    <CSXSubmissionDate xmlns="4873beb7-5857-4685-be1f-d57550cc96cc" xsi:nil="true"/>
+    <CSXUpdate xmlns="4873beb7-5857-4685-be1f-d57550cc96cc">false</CSXUpdate>
+    <Milestone xmlns="4873beb7-5857-4685-be1f-d57550cc96cc" xsi:nil="true"/>
+    <RecommendationsModifier xmlns="4873beb7-5857-4685-be1f-d57550cc96cc" xsi:nil="true"/>
+    <OriginAsset xmlns="4873beb7-5857-4685-be1f-d57550cc96cc" xsi:nil="true"/>
+    <TPComponent xmlns="4873beb7-5857-4685-be1f-d57550cc96cc" xsi:nil="true"/>
+    <AssetId xmlns="4873beb7-5857-4685-be1f-d57550cc96cc">TP102801114</AssetId>
+    <IntlLocPriority xmlns="4873beb7-5857-4685-be1f-d57550cc96cc" xsi:nil="true"/>
+    <PolicheckWords xmlns="4873beb7-5857-4685-be1f-d57550cc96cc" xsi:nil="true"/>
+    <TPLaunchHelpLink xmlns="4873beb7-5857-4685-be1f-d57550cc96cc" xsi:nil="true"/>
+    <TPApplication xmlns="4873beb7-5857-4685-be1f-d57550cc96cc" xsi:nil="true"/>
+    <CrawlForDependencies xmlns="4873beb7-5857-4685-be1f-d57550cc96cc">false</CrawlForDependencies>
+    <HandoffToMSDN xmlns="4873beb7-5857-4685-be1f-d57550cc96cc" xsi:nil="true"/>
+    <PlannedPubDate xmlns="4873beb7-5857-4685-be1f-d57550cc96cc" xsi:nil="true"/>
+    <IntlLangReviewer xmlns="4873beb7-5857-4685-be1f-d57550cc96cc" xsi:nil="true"/>
+    <TrustLevel xmlns="4873beb7-5857-4685-be1f-d57550cc96cc">1 Microsoft Managed Content</TrustLevel>
+    <LocLastLocAttemptVersionLookup xmlns="4873beb7-5857-4685-be1f-d57550cc96cc">706531</LocLastLocAttemptVersionLookup>
+    <IsSearchable xmlns="4873beb7-5857-4685-be1f-d57550cc96cc">true</IsSearchable>
+    <TemplateTemplateType xmlns="4873beb7-5857-4685-be1f-d57550cc96cc">PowerPoint Presentation Template</TemplateTemplateType>
+    <CampaignTagsTaxHTField0 xmlns="4873beb7-5857-4685-be1f-d57550cc96cc">
+      <Terms xmlns="http://schemas.microsoft.com/office/infopath/2007/PartnerControls"/>
+    </CampaignTagsTaxHTField0>
+    <TPNamespace xmlns="4873beb7-5857-4685-be1f-d57550cc96cc" xsi:nil="true"/>
+    <TaxCatchAll xmlns="4873beb7-5857-4685-be1f-d57550cc96cc"/>
+    <Markets xmlns="4873beb7-5857-4685-be1f-d57550cc96cc"/>
+    <UAProjectedTotalWords xmlns="4873beb7-5857-4685-be1f-d57550cc96cc" xsi:nil="true"/>
+    <IntlLangReview xmlns="4873beb7-5857-4685-be1f-d57550cc96cc">false</IntlLangReview>
+    <OutputCachingOn xmlns="4873beb7-5857-4685-be1f-d57550cc96cc">false</OutputCachingOn>
+    <AverageRating xmlns="4873beb7-5857-4685-be1f-d57550cc96cc" xsi:nil="true"/>
+    <APAuthor xmlns="4873beb7-5857-4685-be1f-d57550cc96cc">
+      <UserInfo>
+        <DisplayName>REDMOND\v-soujap</DisplayName>
+        <AccountId>1954</AccountId>
+        <AccountType/>
+      </UserInfo>
+    </APAuthor>
+    <LocManualTestRequired xmlns="4873beb7-5857-4685-be1f-d57550cc96cc">false</LocManualTestRequired>
+    <TPCommandLine xmlns="4873beb7-5857-4685-be1f-d57550cc96cc" xsi:nil="true"/>
+    <TPAppVersion xmlns="4873beb7-5857-4685-be1f-d57550cc96cc" xsi:nil="true"/>
+    <EditorialStatus xmlns="4873beb7-5857-4685-be1f-d57550cc96cc">Complete</EditorialStatus>
+    <LastModifiedDateTime xmlns="4873beb7-5857-4685-be1f-d57550cc96cc" xsi:nil="true"/>
+    <ScenarioTagsTaxHTField0 xmlns="4873beb7-5857-4685-be1f-d57550cc96cc">
+      <Terms xmlns="http://schemas.microsoft.com/office/infopath/2007/PartnerControls"/>
+    </ScenarioTagsTaxHTField0>
+    <OriginalRelease xmlns="4873beb7-5857-4685-be1f-d57550cc96cc">14</OriginalRelease>
+    <TPLaunchHelpLinkType xmlns="4873beb7-5857-4685-be1f-d57550cc96cc">Template</TPLaunchHelpLinkType>
+    <LocalizationTagsTaxHTField0 xmlns="4873beb7-5857-4685-be1f-d57550cc96cc">
+      <Terms xmlns="http://schemas.microsoft.com/office/infopath/2007/PartnerControls"/>
+    </LocalizationTagsTaxHTField0>
+    <LocMarketGroupTiers2 xmlns="4873beb7-5857-4685-be1f-d57550cc96cc" xsi:nil="true"/>
+  </documentManagement>
+</p:properties>
 </file>
 
-<file path=customXml/itemProps3.xml><?xml version="1.0" encoding="utf-8"?>
+<file path=customXml/itemProps1.xml><?xml version="1.0" encoding="utf-8"?>
 <ds:datastoreItem xmlns:ds="http://schemas.openxmlformats.org/officeDocument/2006/customXml" ds:itemID="{6EB9514F-6A45-47F4-BC6D-A865E2971712}">
   <ds:schemaRefs>
     <ds:schemaRef ds:uri="http://schemas.microsoft.com/office/2006/metadata/contentType"/>
@@ -7429,4 +8720,28 @@
     <ds:schemaRef ds:uri="http://schemas.microsoft.com/internal/obd"/>
   </ds:schemaRefs>
 </ds:datastoreItem>
+</file>
+
+<file path=customXml/itemProps2.xml><?xml version="1.0" encoding="utf-8"?>
+<ds:datastoreItem xmlns:ds="http://schemas.openxmlformats.org/officeDocument/2006/customXml" ds:itemID="{3C20563B-C646-42AF-9D0D-76DF086793C3}">
+  <ds:schemaRefs>
+    <ds:schemaRef ds:uri="http://schemas.microsoft.com/sharepoint/v3/contenttype/forms"/>
+  </ds:schemaRefs>
+</ds:datastoreItem>
+</file>
+
+<file path=customXml/itemProps3.xml><?xml version="1.0" encoding="utf-8"?>
+<ds:datastoreItem xmlns:ds="http://schemas.openxmlformats.org/officeDocument/2006/customXml" ds:itemID="{C335E791-7449-4708-8DE9-182EC4D8A134}">
+  <ds:schemaRefs>
+    <ds:schemaRef ds:uri="http://schemas.microsoft.com/office/infopath/2007/PartnerControls"/>
+    <ds:schemaRef ds:uri="http://www.w3.org/XML/1998/namespace"/>
+    <ds:schemaRef ds:uri="http://purl.org/dc/terms/"/>
+    <ds:schemaRef ds:uri="http://schemas.microsoft.com/office/2006/documentManagement/types"/>
+    <ds:schemaRef ds:uri="4873beb7-5857-4685-be1f-d57550cc96cc"/>
+    <ds:schemaRef ds:uri="http://schemas.openxmlformats.org/package/2006/metadata/core-properties"/>
+    <ds:schemaRef ds:uri="http://purl.org/dc/elements/1.1/"/>
+    <ds:schemaRef ds:uri="http://schemas.microsoft.com/office/2006/metadata/properties"/>
+    <ds:schemaRef ds:uri="http://purl.org/dc/dcmitype/"/>
+  </ds:schemaRefs>
+</ds:datastoreItem>
 </file>
</xml_diff>